<commit_message>
UPDATE: modify report & slides
</commit_message>
<xml_diff>
--- a/presentation/Final Project OOP Slides.pptx
+++ b/presentation/Final Project OOP Slides.pptx
@@ -17,9 +17,9 @@
     <p:sldId id="316" r:id="rId8"/>
     <p:sldId id="317" r:id="rId9"/>
     <p:sldId id="318" r:id="rId10"/>
-    <p:sldId id="319" r:id="rId11"/>
-    <p:sldId id="320" r:id="rId12"/>
-    <p:sldId id="321" r:id="rId13"/>
+    <p:sldId id="321" r:id="rId11"/>
+    <p:sldId id="319" r:id="rId12"/>
+    <p:sldId id="320" r:id="rId13"/>
     <p:sldId id="272" r:id="rId14"/>
     <p:sldId id="284" r:id="rId15"/>
   </p:sldIdLst>
@@ -931,7 +931,7 @@
     </p:spTree>
     <p:extLst>
       <p:ext uri="{BB962C8B-B14F-4D97-AF65-F5344CB8AC3E}">
-        <p14:creationId xmlns:p14="http://schemas.microsoft.com/office/powerpoint/2010/main" val="2579508847"/>
+        <p14:creationId xmlns:p14="http://schemas.microsoft.com/office/powerpoint/2010/main" val="405162759"/>
       </p:ext>
     </p:extLst>
   </p:cSld>
@@ -1040,7 +1040,7 @@
     </p:spTree>
     <p:extLst>
       <p:ext uri="{BB962C8B-B14F-4D97-AF65-F5344CB8AC3E}">
-        <p14:creationId xmlns:p14="http://schemas.microsoft.com/office/powerpoint/2010/main" val="87499959"/>
+        <p14:creationId xmlns:p14="http://schemas.microsoft.com/office/powerpoint/2010/main" val="2579508847"/>
       </p:ext>
     </p:extLst>
   </p:cSld>
@@ -1149,7 +1149,7 @@
     </p:spTree>
     <p:extLst>
       <p:ext uri="{BB962C8B-B14F-4D97-AF65-F5344CB8AC3E}">
-        <p14:creationId xmlns:p14="http://schemas.microsoft.com/office/powerpoint/2010/main" val="1731694012"/>
+        <p14:creationId xmlns:p14="http://schemas.microsoft.com/office/powerpoint/2010/main" val="87499959"/>
       </p:ext>
     </p:extLst>
   </p:cSld>
@@ -2108,6 +2108,10 @@
               </a:spcAft>
               <a:buNone/>
             </a:pPr>
+            <a:r>
+              <a:rPr lang="en-US"/>
+              <a:t>sadasdasdasdsa</a:t>
+            </a:r>
             <a:endParaRPr/>
           </a:p>
         </p:txBody>
@@ -3598,7 +3602,7 @@
         </p:nvSpPr>
         <p:spPr>
           <a:xfrm flipH="1">
-            <a:off x="7024500" y="2600625"/>
+            <a:off x="7078289" y="2653518"/>
             <a:ext cx="3405900" cy="3302400"/>
           </a:xfrm>
           <a:prstGeom prst="rtTriangle">
@@ -3646,7 +3650,7 @@
         </p:nvSpPr>
         <p:spPr>
           <a:xfrm flipH="1">
-            <a:off x="7128800" y="2600625"/>
+            <a:off x="7182589" y="2653518"/>
             <a:ext cx="3405900" cy="3302400"/>
           </a:xfrm>
           <a:prstGeom prst="rtTriangle">
@@ -3690,7 +3694,7 @@
         </p:nvSpPr>
         <p:spPr>
           <a:xfrm rot="10800000" flipH="1">
-            <a:off x="-762425" y="-915550"/>
+            <a:off x="-810900" y="-1063468"/>
             <a:ext cx="3405900" cy="3302400"/>
           </a:xfrm>
           <a:prstGeom prst="rtTriangle">
@@ -7534,6 +7538,403 @@
         </p:nvSpPr>
         <p:spPr>
           <a:xfrm>
+            <a:off x="1705088" y="657"/>
+            <a:ext cx="5762400" cy="699900"/>
+          </a:xfrm>
+          <a:prstGeom prst="rect">
+            <a:avLst/>
+          </a:prstGeom>
+          <a:noFill/>
+          <a:ln>
+            <a:noFill/>
+          </a:ln>
+        </p:spPr>
+        <p:txBody>
+          <a:bodyPr spcFirstLastPara="1" wrap="square" lIns="91425" tIns="91425" rIns="91425" bIns="91425" anchor="ctr" anchorCtr="0">
+            <a:noAutofit/>
+          </a:bodyPr>
+          <a:lstStyle>
+            <a:defPPr marR="0" lvl="0" algn="l" rtl="0">
+              <a:lnSpc>
+                <a:spcPct val="100000"/>
+              </a:lnSpc>
+              <a:spcBef>
+                <a:spcPts val="0"/>
+              </a:spcBef>
+              <a:spcAft>
+                <a:spcPts val="0"/>
+              </a:spcAft>
+            </a:defPPr>
+            <a:lvl1pPr marR="0" lvl="0" algn="ctr" rtl="0">
+              <a:lnSpc>
+                <a:spcPct val="100000"/>
+              </a:lnSpc>
+              <a:spcBef>
+                <a:spcPts val="0"/>
+              </a:spcBef>
+              <a:spcAft>
+                <a:spcPts val="0"/>
+              </a:spcAft>
+              <a:buClr>
+                <a:schemeClr val="dk1"/>
+              </a:buClr>
+              <a:buSzPts val="2700"/>
+              <a:buFont typeface="Julius Sans One"/>
+              <a:buNone/>
+              <a:defRPr sz="3000" b="1" i="0" u="none" strike="noStrike" cap="none">
+                <a:solidFill>
+                  <a:schemeClr val="dk1"/>
+                </a:solidFill>
+                <a:latin typeface="Julius Sans One"/>
+                <a:ea typeface="Julius Sans One"/>
+                <a:cs typeface="Julius Sans One"/>
+                <a:sym typeface="Julius Sans One"/>
+              </a:defRPr>
+            </a:lvl1pPr>
+            <a:lvl2pPr marR="0" lvl="1" algn="ctr" rtl="0">
+              <a:lnSpc>
+                <a:spcPct val="100000"/>
+              </a:lnSpc>
+              <a:spcBef>
+                <a:spcPts val="0"/>
+              </a:spcBef>
+              <a:spcAft>
+                <a:spcPts val="0"/>
+              </a:spcAft>
+              <a:buClr>
+                <a:schemeClr val="dk1"/>
+              </a:buClr>
+              <a:buSzPts val="3000"/>
+              <a:buFont typeface="Julius Sans One"/>
+              <a:buNone/>
+              <a:defRPr sz="3000" b="1" i="0" u="none" strike="noStrike" cap="none">
+                <a:solidFill>
+                  <a:schemeClr val="dk1"/>
+                </a:solidFill>
+                <a:latin typeface="Julius Sans One"/>
+                <a:ea typeface="Julius Sans One"/>
+                <a:cs typeface="Julius Sans One"/>
+                <a:sym typeface="Julius Sans One"/>
+              </a:defRPr>
+            </a:lvl2pPr>
+            <a:lvl3pPr marR="0" lvl="2" algn="ctr" rtl="0">
+              <a:lnSpc>
+                <a:spcPct val="100000"/>
+              </a:lnSpc>
+              <a:spcBef>
+                <a:spcPts val="0"/>
+              </a:spcBef>
+              <a:spcAft>
+                <a:spcPts val="0"/>
+              </a:spcAft>
+              <a:buClr>
+                <a:schemeClr val="dk1"/>
+              </a:buClr>
+              <a:buSzPts val="3000"/>
+              <a:buFont typeface="Julius Sans One"/>
+              <a:buNone/>
+              <a:defRPr sz="3000" b="1" i="0" u="none" strike="noStrike" cap="none">
+                <a:solidFill>
+                  <a:schemeClr val="dk1"/>
+                </a:solidFill>
+                <a:latin typeface="Julius Sans One"/>
+                <a:ea typeface="Julius Sans One"/>
+                <a:cs typeface="Julius Sans One"/>
+                <a:sym typeface="Julius Sans One"/>
+              </a:defRPr>
+            </a:lvl3pPr>
+            <a:lvl4pPr marR="0" lvl="3" algn="ctr" rtl="0">
+              <a:lnSpc>
+                <a:spcPct val="100000"/>
+              </a:lnSpc>
+              <a:spcBef>
+                <a:spcPts val="0"/>
+              </a:spcBef>
+              <a:spcAft>
+                <a:spcPts val="0"/>
+              </a:spcAft>
+              <a:buClr>
+                <a:schemeClr val="dk1"/>
+              </a:buClr>
+              <a:buSzPts val="3000"/>
+              <a:buFont typeface="Julius Sans One"/>
+              <a:buNone/>
+              <a:defRPr sz="3000" b="1" i="0" u="none" strike="noStrike" cap="none">
+                <a:solidFill>
+                  <a:schemeClr val="dk1"/>
+                </a:solidFill>
+                <a:latin typeface="Julius Sans One"/>
+                <a:ea typeface="Julius Sans One"/>
+                <a:cs typeface="Julius Sans One"/>
+                <a:sym typeface="Julius Sans One"/>
+              </a:defRPr>
+            </a:lvl4pPr>
+            <a:lvl5pPr marR="0" lvl="4" algn="ctr" rtl="0">
+              <a:lnSpc>
+                <a:spcPct val="100000"/>
+              </a:lnSpc>
+              <a:spcBef>
+                <a:spcPts val="0"/>
+              </a:spcBef>
+              <a:spcAft>
+                <a:spcPts val="0"/>
+              </a:spcAft>
+              <a:buClr>
+                <a:schemeClr val="dk1"/>
+              </a:buClr>
+              <a:buSzPts val="3000"/>
+              <a:buFont typeface="Julius Sans One"/>
+              <a:buNone/>
+              <a:defRPr sz="3000" b="1" i="0" u="none" strike="noStrike" cap="none">
+                <a:solidFill>
+                  <a:schemeClr val="dk1"/>
+                </a:solidFill>
+                <a:latin typeface="Julius Sans One"/>
+                <a:ea typeface="Julius Sans One"/>
+                <a:cs typeface="Julius Sans One"/>
+                <a:sym typeface="Julius Sans One"/>
+              </a:defRPr>
+            </a:lvl5pPr>
+            <a:lvl6pPr marR="0" lvl="5" algn="ctr" rtl="0">
+              <a:lnSpc>
+                <a:spcPct val="100000"/>
+              </a:lnSpc>
+              <a:spcBef>
+                <a:spcPts val="0"/>
+              </a:spcBef>
+              <a:spcAft>
+                <a:spcPts val="0"/>
+              </a:spcAft>
+              <a:buClr>
+                <a:schemeClr val="dk1"/>
+              </a:buClr>
+              <a:buSzPts val="3000"/>
+              <a:buFont typeface="Julius Sans One"/>
+              <a:buNone/>
+              <a:defRPr sz="3000" b="1" i="0" u="none" strike="noStrike" cap="none">
+                <a:solidFill>
+                  <a:schemeClr val="dk1"/>
+                </a:solidFill>
+                <a:latin typeface="Julius Sans One"/>
+                <a:ea typeface="Julius Sans One"/>
+                <a:cs typeface="Julius Sans One"/>
+                <a:sym typeface="Julius Sans One"/>
+              </a:defRPr>
+            </a:lvl6pPr>
+            <a:lvl7pPr marR="0" lvl="6" algn="ctr" rtl="0">
+              <a:lnSpc>
+                <a:spcPct val="100000"/>
+              </a:lnSpc>
+              <a:spcBef>
+                <a:spcPts val="0"/>
+              </a:spcBef>
+              <a:spcAft>
+                <a:spcPts val="0"/>
+              </a:spcAft>
+              <a:buClr>
+                <a:schemeClr val="dk1"/>
+              </a:buClr>
+              <a:buSzPts val="3000"/>
+              <a:buFont typeface="Julius Sans One"/>
+              <a:buNone/>
+              <a:defRPr sz="3000" b="1" i="0" u="none" strike="noStrike" cap="none">
+                <a:solidFill>
+                  <a:schemeClr val="dk1"/>
+                </a:solidFill>
+                <a:latin typeface="Julius Sans One"/>
+                <a:ea typeface="Julius Sans One"/>
+                <a:cs typeface="Julius Sans One"/>
+                <a:sym typeface="Julius Sans One"/>
+              </a:defRPr>
+            </a:lvl7pPr>
+            <a:lvl8pPr marR="0" lvl="7" algn="ctr" rtl="0">
+              <a:lnSpc>
+                <a:spcPct val="100000"/>
+              </a:lnSpc>
+              <a:spcBef>
+                <a:spcPts val="0"/>
+              </a:spcBef>
+              <a:spcAft>
+                <a:spcPts val="0"/>
+              </a:spcAft>
+              <a:buClr>
+                <a:schemeClr val="dk1"/>
+              </a:buClr>
+              <a:buSzPts val="3000"/>
+              <a:buFont typeface="Julius Sans One"/>
+              <a:buNone/>
+              <a:defRPr sz="3000" b="1" i="0" u="none" strike="noStrike" cap="none">
+                <a:solidFill>
+                  <a:schemeClr val="dk1"/>
+                </a:solidFill>
+                <a:latin typeface="Julius Sans One"/>
+                <a:ea typeface="Julius Sans One"/>
+                <a:cs typeface="Julius Sans One"/>
+                <a:sym typeface="Julius Sans One"/>
+              </a:defRPr>
+            </a:lvl8pPr>
+            <a:lvl9pPr marR="0" lvl="8" algn="ctr" rtl="0">
+              <a:lnSpc>
+                <a:spcPct val="100000"/>
+              </a:lnSpc>
+              <a:spcBef>
+                <a:spcPts val="0"/>
+              </a:spcBef>
+              <a:spcAft>
+                <a:spcPts val="0"/>
+              </a:spcAft>
+              <a:buClr>
+                <a:schemeClr val="dk1"/>
+              </a:buClr>
+              <a:buSzPts val="3000"/>
+              <a:buFont typeface="Julius Sans One"/>
+              <a:buNone/>
+              <a:defRPr sz="3000" b="1" i="0" u="none" strike="noStrike" cap="none">
+                <a:solidFill>
+                  <a:schemeClr val="dk1"/>
+                </a:solidFill>
+                <a:latin typeface="Julius Sans One"/>
+                <a:ea typeface="Julius Sans One"/>
+                <a:cs typeface="Julius Sans One"/>
+                <a:sym typeface="Julius Sans One"/>
+              </a:defRPr>
+            </a:lvl9pPr>
+          </a:lstStyle>
+          <a:p>
+            <a:r>
+              <a:rPr lang="en-US"/>
+              <a:t>class diagram for util</a:t>
+            </a:r>
+          </a:p>
+        </p:txBody>
+      </p:sp>
+      <p:cxnSp>
+        <p:nvCxnSpPr>
+          <p:cNvPr id="10" name="Google Shape;304;p43">
+            <a:extLst>
+              <a:ext uri="{FF2B5EF4-FFF2-40B4-BE49-F238E27FC236}">
+                <a16:creationId xmlns:a16="http://schemas.microsoft.com/office/drawing/2014/main" id="{A8BE6309-0937-469C-88DE-C7A24E1A2B99}"/>
+              </a:ext>
+            </a:extLst>
+          </p:cNvPr>
+          <p:cNvCxnSpPr>
+            <a:cxnSpLocks/>
+          </p:cNvCxnSpPr>
+          <p:nvPr/>
+        </p:nvCxnSpPr>
+        <p:spPr>
+          <a:xfrm>
+            <a:off x="1993107" y="700557"/>
+            <a:ext cx="5236369" cy="0"/>
+          </a:xfrm>
+          <a:prstGeom prst="straightConnector1">
+            <a:avLst/>
+          </a:prstGeom>
+          <a:noFill/>
+          <a:ln w="19050" cap="flat" cmpd="sng">
+            <a:solidFill>
+              <a:schemeClr val="lt1"/>
+            </a:solidFill>
+            <a:prstDash val="solid"/>
+            <a:round/>
+            <a:headEnd type="none" w="med" len="med"/>
+            <a:tailEnd type="none" w="med" len="med"/>
+          </a:ln>
+        </p:spPr>
+      </p:cxnSp>
+      <p:pic>
+        <p:nvPicPr>
+          <p:cNvPr id="11" name="Picture 10">
+            <a:extLst>
+              <a:ext uri="{FF2B5EF4-FFF2-40B4-BE49-F238E27FC236}">
+                <a16:creationId xmlns:a16="http://schemas.microsoft.com/office/drawing/2014/main" id="{7C03E1B4-1044-43F3-9433-EF2E7EEAB129}"/>
+              </a:ext>
+            </a:extLst>
+          </p:cNvPr>
+          <p:cNvPicPr/>
+          <p:nvPr/>
+        </p:nvPicPr>
+        <p:blipFill>
+          <a:blip r:embed="rId3">
+            <a:extLst>
+              <a:ext uri="{28A0092B-C50C-407E-A947-70E740481C1C}">
+                <a14:useLocalDpi xmlns:a14="http://schemas.microsoft.com/office/drawing/2010/main" val="0"/>
+              </a:ext>
+            </a:extLst>
+          </a:blip>
+          <a:srcRect/>
+          <a:stretch>
+            <a:fillRect/>
+          </a:stretch>
+        </p:blipFill>
+        <p:spPr bwMode="auto">
+          <a:xfrm>
+            <a:off x="1849085" y="741941"/>
+            <a:ext cx="5445829" cy="4098815"/>
+          </a:xfrm>
+          <a:prstGeom prst="rect">
+            <a:avLst/>
+          </a:prstGeom>
+          <a:noFill/>
+          <a:ln>
+            <a:noFill/>
+          </a:ln>
+        </p:spPr>
+      </p:pic>
+    </p:spTree>
+    <p:extLst>
+      <p:ext uri="{BB962C8B-B14F-4D97-AF65-F5344CB8AC3E}">
+        <p14:creationId xmlns:p14="http://schemas.microsoft.com/office/powerpoint/2010/main" val="3482504378"/>
+      </p:ext>
+    </p:extLst>
+  </p:cSld>
+  <p:clrMapOvr>
+    <a:masterClrMapping/>
+  </p:clrMapOvr>
+</p:sld>
+</file>
+
+<file path=ppt/slides/slide11.xml><?xml version="1.0" encoding="utf-8"?>
+<p:sld xmlns:a="http://schemas.openxmlformats.org/drawingml/2006/main" xmlns:r="http://schemas.openxmlformats.org/officeDocument/2006/relationships" xmlns:p="http://schemas.openxmlformats.org/presentationml/2006/main">
+  <p:cSld>
+    <p:bg>
+      <p:bgPr>
+        <a:solidFill>
+          <a:schemeClr val="accent6"/>
+        </a:solidFill>
+        <a:effectLst/>
+      </p:bgPr>
+    </p:bg>
+    <p:spTree>
+      <p:nvGrpSpPr>
+        <p:cNvPr id="1" name="Shape 390"/>
+        <p:cNvGrpSpPr/>
+        <p:nvPr/>
+      </p:nvGrpSpPr>
+      <p:grpSpPr>
+        <a:xfrm>
+          <a:off x="0" y="0"/>
+          <a:ext cx="0" cy="0"/>
+          <a:chOff x="0" y="0"/>
+          <a:chExt cx="0" cy="0"/>
+        </a:xfrm>
+      </p:grpSpPr>
+      <p:sp>
+        <p:nvSpPr>
+          <p:cNvPr id="9" name="Google Shape;302;p43">
+            <a:extLst>
+              <a:ext uri="{FF2B5EF4-FFF2-40B4-BE49-F238E27FC236}">
+                <a16:creationId xmlns:a16="http://schemas.microsoft.com/office/drawing/2014/main" id="{1F4DA788-0E47-4846-B8D1-4CDB8F216CD0}"/>
+              </a:ext>
+            </a:extLst>
+          </p:cNvPr>
+          <p:cNvSpPr txBox="1">
+            <a:spLocks/>
+          </p:cNvSpPr>
+          <p:nvPr/>
+        </p:nvSpPr>
+        <p:spPr>
+          <a:xfrm>
             <a:off x="1705088" y="-6487"/>
             <a:ext cx="5762400" cy="699900"/>
           </a:xfrm>
@@ -7890,7 +8291,7 @@
 </p:sld>
 </file>
 
-<file path=ppt/slides/slide11.xml><?xml version="1.0" encoding="utf-8"?>
+<file path=ppt/slides/slide12.xml><?xml version="1.0" encoding="utf-8"?>
 <p:sld xmlns:a="http://schemas.openxmlformats.org/drawingml/2006/main" xmlns:r="http://schemas.openxmlformats.org/officeDocument/2006/relationships" xmlns:p="http://schemas.openxmlformats.org/presentationml/2006/main">
   <p:cSld>
     <p:bg>
@@ -8249,8 +8650,8 @@
         </p:nvSpPr>
         <p:spPr>
           <a:xfrm>
-            <a:off x="600075" y="842430"/>
-            <a:ext cx="8022431" cy="3715120"/>
+            <a:off x="560784" y="693413"/>
+            <a:ext cx="8022431" cy="4692823"/>
           </a:xfrm>
           <a:prstGeom prst="rect">
             <a:avLst/>
@@ -8262,30 +8663,6 @@
             <a:spAutoFit/>
           </a:bodyPr>
           <a:lstStyle/>
-          <a:p>
-            <a:pPr marL="342900" marR="0" indent="-285750" algn="just">
-              <a:lnSpc>
-                <a:spcPct val="115000"/>
-              </a:lnSpc>
-              <a:spcBef>
-                <a:spcPts val="0"/>
-              </a:spcBef>
-              <a:spcAft>
-                <a:spcPts val="1000"/>
-              </a:spcAft>
-              <a:buFont typeface="Arial" panose="020B0604020202020204" pitchFamily="34" charset="0"/>
-              <a:buChar char="•"/>
-            </a:pPr>
-            <a:r>
-              <a:rPr lang="en-US" sz="2400">
-                <a:effectLst/>
-                <a:latin typeface="Didact Gothic" panose="020B0604020202020204" charset="0"/>
-                <a:ea typeface="Arial" panose="020B0604020202020204" pitchFamily="34" charset="0"/>
-                <a:cs typeface="Times New Roman" panose="02020603050405020304" pitchFamily="18" charset="0"/>
-              </a:rPr>
-              <a:t>A column possibly contains implicants, the intermediate table contains one or more columns. </a:t>
-            </a:r>
-          </a:p>
           <a:p>
             <a:pPr marL="342900" marR="0" indent="-285750" algn="just">
               <a:lnSpc>
@@ -8315,7 +8692,28 @@
                 <a:ea typeface="Arial" panose="020B0604020202020204" pitchFamily="34" charset="0"/>
                 <a:cs typeface="Times New Roman" panose="02020603050405020304" pitchFamily="18" charset="0"/>
               </a:rPr>
-              <a:t>he aggregation relationship is used among Implicant class, the Column class, the PITable and the IntermediateTable class</a:t>
+              <a:t>he </a:t>
+            </a:r>
+            <a:r>
+              <a:rPr lang="en-US" sz="2400" b="1">
+                <a:solidFill>
+                  <a:srgbClr val="CC6666"/>
+                </a:solidFill>
+                <a:effectLst/>
+                <a:latin typeface="Didact Gothic" panose="020B0604020202020204" charset="0"/>
+                <a:ea typeface="Arial" panose="020B0604020202020204" pitchFamily="34" charset="0"/>
+                <a:cs typeface="Times New Roman" panose="02020603050405020304" pitchFamily="18" charset="0"/>
+              </a:rPr>
+              <a:t>aggregation relationship </a:t>
+            </a:r>
+            <a:r>
+              <a:rPr lang="en-US" sz="2400">
+                <a:effectLst/>
+                <a:latin typeface="Didact Gothic" panose="020B0604020202020204" charset="0"/>
+                <a:ea typeface="Arial" panose="020B0604020202020204" pitchFamily="34" charset="0"/>
+                <a:cs typeface="Times New Roman" panose="02020603050405020304" pitchFamily="18" charset="0"/>
+              </a:rPr>
+              <a:t>is used among Implicant class, the Column class, the PITable and the IntermediateTable class</a:t>
             </a:r>
           </a:p>
           <a:p>
@@ -8339,432 +8737,20 @@
                 <a:ea typeface="Arial" panose="020B0604020202020204" pitchFamily="34" charset="0"/>
                 <a:cs typeface="Times New Roman" panose="02020603050405020304" pitchFamily="18" charset="0"/>
               </a:rPr>
-              <a:t>However, the IntermediateTable must contain at least one column, so the relationship between those two is a strong composite relationship</a:t>
+              <a:t>However, the IntermediateTable must contain at least one column, so the relationship between those two is a </a:t>
             </a:r>
-          </a:p>
-        </p:txBody>
-      </p:sp>
-    </p:spTree>
-    <p:extLst>
-      <p:ext uri="{BB962C8B-B14F-4D97-AF65-F5344CB8AC3E}">
-        <p14:creationId xmlns:p14="http://schemas.microsoft.com/office/powerpoint/2010/main" val="1019771292"/>
-      </p:ext>
-    </p:extLst>
-  </p:cSld>
-  <p:clrMapOvr>
-    <a:masterClrMapping/>
-  </p:clrMapOvr>
-</p:sld>
-</file>
-
-<file path=ppt/slides/slide12.xml><?xml version="1.0" encoding="utf-8"?>
-<p:sld xmlns:a="http://schemas.openxmlformats.org/drawingml/2006/main" xmlns:r="http://schemas.openxmlformats.org/officeDocument/2006/relationships" xmlns:p="http://schemas.openxmlformats.org/presentationml/2006/main">
-  <p:cSld>
-    <p:bg>
-      <p:bgPr>
-        <a:solidFill>
-          <a:schemeClr val="accent6"/>
-        </a:solidFill>
-        <a:effectLst/>
-      </p:bgPr>
-    </p:bg>
-    <p:spTree>
-      <p:nvGrpSpPr>
-        <p:cNvPr id="1" name="Shape 390"/>
-        <p:cNvGrpSpPr/>
-        <p:nvPr/>
-      </p:nvGrpSpPr>
-      <p:grpSpPr>
-        <a:xfrm>
-          <a:off x="0" y="0"/>
-          <a:ext cx="0" cy="0"/>
-          <a:chOff x="0" y="0"/>
-          <a:chExt cx="0" cy="0"/>
-        </a:xfrm>
-      </p:grpSpPr>
-      <p:sp>
-        <p:nvSpPr>
-          <p:cNvPr id="9" name="Google Shape;302;p43">
-            <a:extLst>
-              <a:ext uri="{FF2B5EF4-FFF2-40B4-BE49-F238E27FC236}">
-                <a16:creationId xmlns:a16="http://schemas.microsoft.com/office/drawing/2014/main" id="{1F4DA788-0E47-4846-B8D1-4CDB8F216CD0}"/>
-              </a:ext>
-            </a:extLst>
-          </p:cNvPr>
-          <p:cNvSpPr txBox="1">
-            <a:spLocks/>
-          </p:cNvSpPr>
-          <p:nvPr/>
-        </p:nvSpPr>
-        <p:spPr>
-          <a:xfrm>
-            <a:off x="1705088" y="-6487"/>
-            <a:ext cx="5762400" cy="699900"/>
-          </a:xfrm>
-          <a:prstGeom prst="rect">
-            <a:avLst/>
-          </a:prstGeom>
-          <a:noFill/>
-          <a:ln>
-            <a:noFill/>
-          </a:ln>
-        </p:spPr>
-        <p:txBody>
-          <a:bodyPr spcFirstLastPara="1" wrap="square" lIns="91425" tIns="91425" rIns="91425" bIns="91425" anchor="ctr" anchorCtr="0">
-            <a:noAutofit/>
-          </a:bodyPr>
-          <a:lstStyle>
-            <a:defPPr marR="0" lvl="0" algn="l" rtl="0">
-              <a:lnSpc>
-                <a:spcPct val="100000"/>
-              </a:lnSpc>
-              <a:spcBef>
-                <a:spcPts val="0"/>
-              </a:spcBef>
-              <a:spcAft>
-                <a:spcPts val="0"/>
-              </a:spcAft>
-            </a:defPPr>
-            <a:lvl1pPr marR="0" lvl="0" algn="ctr" rtl="0">
-              <a:lnSpc>
-                <a:spcPct val="100000"/>
-              </a:lnSpc>
-              <a:spcBef>
-                <a:spcPts val="0"/>
-              </a:spcBef>
-              <a:spcAft>
-                <a:spcPts val="0"/>
-              </a:spcAft>
-              <a:buClr>
-                <a:schemeClr val="dk1"/>
-              </a:buClr>
-              <a:buSzPts val="2700"/>
-              <a:buFont typeface="Julius Sans One"/>
-              <a:buNone/>
-              <a:defRPr sz="3000" b="1" i="0" u="none" strike="noStrike" cap="none">
-                <a:solidFill>
-                  <a:schemeClr val="dk1"/>
-                </a:solidFill>
-                <a:latin typeface="Julius Sans One"/>
-                <a:ea typeface="Julius Sans One"/>
-                <a:cs typeface="Julius Sans One"/>
-                <a:sym typeface="Julius Sans One"/>
-              </a:defRPr>
-            </a:lvl1pPr>
-            <a:lvl2pPr marR="0" lvl="1" algn="ctr" rtl="0">
-              <a:lnSpc>
-                <a:spcPct val="100000"/>
-              </a:lnSpc>
-              <a:spcBef>
-                <a:spcPts val="0"/>
-              </a:spcBef>
-              <a:spcAft>
-                <a:spcPts val="0"/>
-              </a:spcAft>
-              <a:buClr>
-                <a:schemeClr val="dk1"/>
-              </a:buClr>
-              <a:buSzPts val="3000"/>
-              <a:buFont typeface="Julius Sans One"/>
-              <a:buNone/>
-              <a:defRPr sz="3000" b="1" i="0" u="none" strike="noStrike" cap="none">
-                <a:solidFill>
-                  <a:schemeClr val="dk1"/>
-                </a:solidFill>
-                <a:latin typeface="Julius Sans One"/>
-                <a:ea typeface="Julius Sans One"/>
-                <a:cs typeface="Julius Sans One"/>
-                <a:sym typeface="Julius Sans One"/>
-              </a:defRPr>
-            </a:lvl2pPr>
-            <a:lvl3pPr marR="0" lvl="2" algn="ctr" rtl="0">
-              <a:lnSpc>
-                <a:spcPct val="100000"/>
-              </a:lnSpc>
-              <a:spcBef>
-                <a:spcPts val="0"/>
-              </a:spcBef>
-              <a:spcAft>
-                <a:spcPts val="0"/>
-              </a:spcAft>
-              <a:buClr>
-                <a:schemeClr val="dk1"/>
-              </a:buClr>
-              <a:buSzPts val="3000"/>
-              <a:buFont typeface="Julius Sans One"/>
-              <a:buNone/>
-              <a:defRPr sz="3000" b="1" i="0" u="none" strike="noStrike" cap="none">
-                <a:solidFill>
-                  <a:schemeClr val="dk1"/>
-                </a:solidFill>
-                <a:latin typeface="Julius Sans One"/>
-                <a:ea typeface="Julius Sans One"/>
-                <a:cs typeface="Julius Sans One"/>
-                <a:sym typeface="Julius Sans One"/>
-              </a:defRPr>
-            </a:lvl3pPr>
-            <a:lvl4pPr marR="0" lvl="3" algn="ctr" rtl="0">
-              <a:lnSpc>
-                <a:spcPct val="100000"/>
-              </a:lnSpc>
-              <a:spcBef>
-                <a:spcPts val="0"/>
-              </a:spcBef>
-              <a:spcAft>
-                <a:spcPts val="0"/>
-              </a:spcAft>
-              <a:buClr>
-                <a:schemeClr val="dk1"/>
-              </a:buClr>
-              <a:buSzPts val="3000"/>
-              <a:buFont typeface="Julius Sans One"/>
-              <a:buNone/>
-              <a:defRPr sz="3000" b="1" i="0" u="none" strike="noStrike" cap="none">
-                <a:solidFill>
-                  <a:schemeClr val="dk1"/>
-                </a:solidFill>
-                <a:latin typeface="Julius Sans One"/>
-                <a:ea typeface="Julius Sans One"/>
-                <a:cs typeface="Julius Sans One"/>
-                <a:sym typeface="Julius Sans One"/>
-              </a:defRPr>
-            </a:lvl4pPr>
-            <a:lvl5pPr marR="0" lvl="4" algn="ctr" rtl="0">
-              <a:lnSpc>
-                <a:spcPct val="100000"/>
-              </a:lnSpc>
-              <a:spcBef>
-                <a:spcPts val="0"/>
-              </a:spcBef>
-              <a:spcAft>
-                <a:spcPts val="0"/>
-              </a:spcAft>
-              <a:buClr>
-                <a:schemeClr val="dk1"/>
-              </a:buClr>
-              <a:buSzPts val="3000"/>
-              <a:buFont typeface="Julius Sans One"/>
-              <a:buNone/>
-              <a:defRPr sz="3000" b="1" i="0" u="none" strike="noStrike" cap="none">
-                <a:solidFill>
-                  <a:schemeClr val="dk1"/>
-                </a:solidFill>
-                <a:latin typeface="Julius Sans One"/>
-                <a:ea typeface="Julius Sans One"/>
-                <a:cs typeface="Julius Sans One"/>
-                <a:sym typeface="Julius Sans One"/>
-              </a:defRPr>
-            </a:lvl5pPr>
-            <a:lvl6pPr marR="0" lvl="5" algn="ctr" rtl="0">
-              <a:lnSpc>
-                <a:spcPct val="100000"/>
-              </a:lnSpc>
-              <a:spcBef>
-                <a:spcPts val="0"/>
-              </a:spcBef>
-              <a:spcAft>
-                <a:spcPts val="0"/>
-              </a:spcAft>
-              <a:buClr>
-                <a:schemeClr val="dk1"/>
-              </a:buClr>
-              <a:buSzPts val="3000"/>
-              <a:buFont typeface="Julius Sans One"/>
-              <a:buNone/>
-              <a:defRPr sz="3000" b="1" i="0" u="none" strike="noStrike" cap="none">
-                <a:solidFill>
-                  <a:schemeClr val="dk1"/>
-                </a:solidFill>
-                <a:latin typeface="Julius Sans One"/>
-                <a:ea typeface="Julius Sans One"/>
-                <a:cs typeface="Julius Sans One"/>
-                <a:sym typeface="Julius Sans One"/>
-              </a:defRPr>
-            </a:lvl6pPr>
-            <a:lvl7pPr marR="0" lvl="6" algn="ctr" rtl="0">
-              <a:lnSpc>
-                <a:spcPct val="100000"/>
-              </a:lnSpc>
-              <a:spcBef>
-                <a:spcPts val="0"/>
-              </a:spcBef>
-              <a:spcAft>
-                <a:spcPts val="0"/>
-              </a:spcAft>
-              <a:buClr>
-                <a:schemeClr val="dk1"/>
-              </a:buClr>
-              <a:buSzPts val="3000"/>
-              <a:buFont typeface="Julius Sans One"/>
-              <a:buNone/>
-              <a:defRPr sz="3000" b="1" i="0" u="none" strike="noStrike" cap="none">
-                <a:solidFill>
-                  <a:schemeClr val="dk1"/>
-                </a:solidFill>
-                <a:latin typeface="Julius Sans One"/>
-                <a:ea typeface="Julius Sans One"/>
-                <a:cs typeface="Julius Sans One"/>
-                <a:sym typeface="Julius Sans One"/>
-              </a:defRPr>
-            </a:lvl7pPr>
-            <a:lvl8pPr marR="0" lvl="7" algn="ctr" rtl="0">
-              <a:lnSpc>
-                <a:spcPct val="100000"/>
-              </a:lnSpc>
-              <a:spcBef>
-                <a:spcPts val="0"/>
-              </a:spcBef>
-              <a:spcAft>
-                <a:spcPts val="0"/>
-              </a:spcAft>
-              <a:buClr>
-                <a:schemeClr val="dk1"/>
-              </a:buClr>
-              <a:buSzPts val="3000"/>
-              <a:buFont typeface="Julius Sans One"/>
-              <a:buNone/>
-              <a:defRPr sz="3000" b="1" i="0" u="none" strike="noStrike" cap="none">
-                <a:solidFill>
-                  <a:schemeClr val="dk1"/>
-                </a:solidFill>
-                <a:latin typeface="Julius Sans One"/>
-                <a:ea typeface="Julius Sans One"/>
-                <a:cs typeface="Julius Sans One"/>
-                <a:sym typeface="Julius Sans One"/>
-              </a:defRPr>
-            </a:lvl8pPr>
-            <a:lvl9pPr marR="0" lvl="8" algn="ctr" rtl="0">
-              <a:lnSpc>
-                <a:spcPct val="100000"/>
-              </a:lnSpc>
-              <a:spcBef>
-                <a:spcPts val="0"/>
-              </a:spcBef>
-              <a:spcAft>
-                <a:spcPts val="0"/>
-              </a:spcAft>
-              <a:buClr>
-                <a:schemeClr val="dk1"/>
-              </a:buClr>
-              <a:buSzPts val="3000"/>
-              <a:buFont typeface="Julius Sans One"/>
-              <a:buNone/>
-              <a:defRPr sz="3000" b="1" i="0" u="none" strike="noStrike" cap="none">
-                <a:solidFill>
-                  <a:schemeClr val="dk1"/>
-                </a:solidFill>
-                <a:latin typeface="Julius Sans One"/>
-                <a:ea typeface="Julius Sans One"/>
-                <a:cs typeface="Julius Sans One"/>
-                <a:sym typeface="Julius Sans One"/>
-              </a:defRPr>
-            </a:lvl9pPr>
-          </a:lstStyle>
-          <a:p>
             <a:r>
-              <a:rPr lang="en-US"/>
-              <a:t>Explanation of oop design</a:t>
-            </a:r>
-          </a:p>
-        </p:txBody>
-      </p:sp>
-      <p:cxnSp>
-        <p:nvCxnSpPr>
-          <p:cNvPr id="10" name="Google Shape;304;p43">
-            <a:extLst>
-              <a:ext uri="{FF2B5EF4-FFF2-40B4-BE49-F238E27FC236}">
-                <a16:creationId xmlns:a16="http://schemas.microsoft.com/office/drawing/2014/main" id="{A8BE6309-0937-469C-88DE-C7A24E1A2B99}"/>
-              </a:ext>
-            </a:extLst>
-          </p:cNvPr>
-          <p:cNvCxnSpPr>
-            <a:cxnSpLocks/>
-          </p:cNvCxnSpPr>
-          <p:nvPr/>
-        </p:nvCxnSpPr>
-        <p:spPr>
-          <a:xfrm>
-            <a:off x="1993107" y="693413"/>
-            <a:ext cx="5236369" cy="0"/>
-          </a:xfrm>
-          <a:prstGeom prst="straightConnector1">
-            <a:avLst/>
-          </a:prstGeom>
-          <a:noFill/>
-          <a:ln w="19050" cap="flat" cmpd="sng">
-            <a:solidFill>
-              <a:schemeClr val="lt1"/>
-            </a:solidFill>
-            <a:prstDash val="solid"/>
-            <a:round/>
-            <a:headEnd type="none" w="med" len="med"/>
-            <a:tailEnd type="none" w="med" len="med"/>
-          </a:ln>
-        </p:spPr>
-      </p:cxnSp>
-      <p:sp>
-        <p:nvSpPr>
-          <p:cNvPr id="6" name="TextBox 5">
-            <a:extLst>
-              <a:ext uri="{FF2B5EF4-FFF2-40B4-BE49-F238E27FC236}">
-                <a16:creationId xmlns:a16="http://schemas.microsoft.com/office/drawing/2014/main" id="{30950A46-D7FA-4EA5-A02F-DFF0392C1391}"/>
-              </a:ext>
-            </a:extLst>
-          </p:cNvPr>
-          <p:cNvSpPr txBox="1"/>
-          <p:nvPr/>
-        </p:nvSpPr>
-        <p:spPr>
-          <a:xfrm>
-            <a:off x="600075" y="842430"/>
-            <a:ext cx="8022431" cy="3843360"/>
-          </a:xfrm>
-          <a:prstGeom prst="rect">
-            <a:avLst/>
-          </a:prstGeom>
-          <a:noFill/>
-        </p:spPr>
-        <p:txBody>
-          <a:bodyPr wrap="square" rtlCol="0">
-            <a:spAutoFit/>
-          </a:bodyPr>
-          <a:lstStyle/>
-          <a:p>
-            <a:pPr marL="342900" indent="-285750" algn="just">
-              <a:lnSpc>
-                <a:spcPct val="115000"/>
-              </a:lnSpc>
-              <a:spcAft>
-                <a:spcPts val="1000"/>
-              </a:spcAft>
-              <a:buFont typeface="Arial" panose="020B0604020202020204" pitchFamily="34" charset="0"/>
-              <a:buChar char="•"/>
-            </a:pPr>
-            <a:r>
-              <a:rPr lang="en-US" sz="2400">
+              <a:rPr lang="en-US" sz="2400" b="1">
+                <a:solidFill>
+                  <a:srgbClr val="CC6666"/>
+                </a:solidFill>
                 <a:effectLst/>
                 <a:latin typeface="Didact Gothic" panose="020B0604020202020204" charset="0"/>
                 <a:ea typeface="Arial" panose="020B0604020202020204" pitchFamily="34" charset="0"/>
                 <a:cs typeface="Times New Roman" panose="02020603050405020304" pitchFamily="18" charset="0"/>
               </a:rPr>
-              <a:t>The Implicant class is a parent class which is inherited by the Minterm class and CombinedImplicant class. All of the other classes interact with Implicant only so the true type is determined when the program is running </a:t>
+              <a:t>strong composite relationship</a:t>
             </a:r>
-            <a:r>
-              <a:rPr lang="en-US" sz="2400">
-                <a:effectLst/>
-                <a:latin typeface="Didact Gothic" panose="020B0604020202020204" charset="0"/>
-                <a:ea typeface="Arial" panose="020B0604020202020204" pitchFamily="34" charset="0"/>
-                <a:cs typeface="Times New Roman" panose="02020603050405020304" pitchFamily="18" charset="0"/>
-                <a:sym typeface="Wingdings" panose="05000000000000000000" pitchFamily="2" charset="2"/>
-              </a:rPr>
-              <a:t> runtime polymorphism</a:t>
-            </a:r>
-            <a:endParaRPr lang="en-US" sz="2400">
-              <a:effectLst/>
-              <a:latin typeface="Didact Gothic" panose="020B0604020202020204" charset="0"/>
-              <a:ea typeface="Arial" panose="020B0604020202020204" pitchFamily="34" charset="0"/>
-              <a:cs typeface="Times New Roman" panose="02020603050405020304" pitchFamily="18" charset="0"/>
-            </a:endParaRPr>
           </a:p>
           <a:p>
             <a:pPr marL="342900" indent="-285750" algn="just">
@@ -8790,20 +8776,27 @@
                 <a:latin typeface="Didact Gothic" panose="020B0604020202020204" charset="0"/>
                 <a:ea typeface="Arial" panose="020B0604020202020204" pitchFamily="34" charset="0"/>
               </a:rPr>
-              <a:t>he IntermediateTable and PITable both inherit the Table class</a:t>
+              <a:t>he IntermediateTable and PITable both </a:t>
             </a:r>
-          </a:p>
-          <a:p>
-            <a:pPr marL="342900" indent="-285750" algn="just">
-              <a:lnSpc>
-                <a:spcPct val="115000"/>
-              </a:lnSpc>
-              <a:spcAft>
-                <a:spcPts val="1000"/>
-              </a:spcAft>
-              <a:buFont typeface="Arial" panose="020B0604020202020204" pitchFamily="34" charset="0"/>
-              <a:buChar char="•"/>
-            </a:pPr>
+            <a:r>
+              <a:rPr lang="en-US" sz="2400" b="1">
+                <a:solidFill>
+                  <a:srgbClr val="CC6666"/>
+                </a:solidFill>
+                <a:effectLst/>
+                <a:latin typeface="Didact Gothic" panose="020B0604020202020204" charset="0"/>
+                <a:ea typeface="Arial" panose="020B0604020202020204" pitchFamily="34" charset="0"/>
+              </a:rPr>
+              <a:t>inherit</a:t>
+            </a:r>
+            <a:r>
+              <a:rPr lang="en-US" sz="2400">
+                <a:effectLst/>
+                <a:latin typeface="Didact Gothic" panose="020B0604020202020204" charset="0"/>
+                <a:ea typeface="Arial" panose="020B0604020202020204" pitchFamily="34" charset="0"/>
+              </a:rPr>
+              <a:t> the Table class. </a:t>
+            </a:r>
             <a:r>
               <a:rPr lang="en-US" sz="2400">
                 <a:latin typeface="Didact Gothic" panose="020B0604020202020204" charset="0"/>
@@ -8817,9 +8810,52 @@
                 <a:latin typeface="Didact Gothic" panose="020B0604020202020204" charset="0"/>
                 <a:ea typeface="Arial" panose="020B0604020202020204" pitchFamily="34" charset="0"/>
               </a:rPr>
-              <a:t>he SOP and POS class should inherit the OuputFunction </a:t>
+              <a:t>he SOP and POS class should </a:t>
+            </a:r>
+            <a:r>
+              <a:rPr lang="en-US" sz="2400" b="1">
+                <a:solidFill>
+                  <a:srgbClr val="CC6666"/>
+                </a:solidFill>
+                <a:effectLst/>
+                <a:latin typeface="Didact Gothic" panose="020B0604020202020204" charset="0"/>
+                <a:ea typeface="Arial" panose="020B0604020202020204" pitchFamily="34" charset="0"/>
+              </a:rPr>
+              <a:t>inherit</a:t>
+            </a:r>
+            <a:r>
+              <a:rPr lang="en-US" sz="2400">
+                <a:effectLst/>
+                <a:latin typeface="Didact Gothic" panose="020B0604020202020204" charset="0"/>
+                <a:ea typeface="Arial" panose="020B0604020202020204" pitchFamily="34" charset="0"/>
+              </a:rPr>
+              <a:t> the CanonicalForm</a:t>
             </a:r>
             <a:endParaRPr lang="en-US" sz="2400">
+              <a:effectLst/>
+              <a:latin typeface="Didact Gothic" panose="020B0604020202020204" charset="0"/>
+              <a:ea typeface="Arial" panose="020B0604020202020204" pitchFamily="34" charset="0"/>
+              <a:cs typeface="Times New Roman" panose="02020603050405020304" pitchFamily="18" charset="0"/>
+            </a:endParaRPr>
+          </a:p>
+          <a:p>
+            <a:pPr marL="342900" marR="0" indent="-285750" algn="just">
+              <a:lnSpc>
+                <a:spcPct val="115000"/>
+              </a:lnSpc>
+              <a:spcBef>
+                <a:spcPts val="0"/>
+              </a:spcBef>
+              <a:spcAft>
+                <a:spcPts val="1000"/>
+              </a:spcAft>
+              <a:buFont typeface="Arial" panose="020B0604020202020204" pitchFamily="34" charset="0"/>
+              <a:buChar char="•"/>
+            </a:pPr>
+            <a:endParaRPr lang="en-US" sz="2400" b="1">
+              <a:solidFill>
+                <a:srgbClr val="CC6666"/>
+              </a:solidFill>
               <a:effectLst/>
               <a:latin typeface="Didact Gothic" panose="020B0604020202020204" charset="0"/>
               <a:ea typeface="Arial" panose="020B0604020202020204" pitchFamily="34" charset="0"/>
@@ -8831,7 +8867,7 @@
     </p:spTree>
     <p:extLst>
       <p:ext uri="{BB962C8B-B14F-4D97-AF65-F5344CB8AC3E}">
-        <p14:creationId xmlns:p14="http://schemas.microsoft.com/office/powerpoint/2010/main" val="2801201098"/>
+        <p14:creationId xmlns:p14="http://schemas.microsoft.com/office/powerpoint/2010/main" val="1019771292"/>
       </p:ext>
     </p:extLst>
   </p:cSld>
@@ -8965,7 +9001,7 @@
         </p:blipFill>
         <p:spPr>
           <a:xfrm>
-            <a:off x="1846651" y="848206"/>
+            <a:off x="1846651" y="777261"/>
             <a:ext cx="5450693" cy="4088020"/>
           </a:xfrm>
           <a:prstGeom prst="rect">
@@ -11072,53 +11108,6 @@
           <a:chExt cx="0" cy="0"/>
         </a:xfrm>
       </p:grpSpPr>
-      <p:pic>
-        <p:nvPicPr>
-          <p:cNvPr id="3074" name="Picture 2">
-            <a:extLst>
-              <a:ext uri="{FF2B5EF4-FFF2-40B4-BE49-F238E27FC236}">
-                <a16:creationId xmlns:a16="http://schemas.microsoft.com/office/drawing/2014/main" id="{B65DAA31-36A7-47C5-B035-17FFA66B2DA3}"/>
-              </a:ext>
-            </a:extLst>
-          </p:cNvPr>
-          <p:cNvPicPr>
-            <a:picLocks noChangeAspect="1" noChangeArrowheads="1"/>
-          </p:cNvPicPr>
-          <p:nvPr/>
-        </p:nvPicPr>
-        <p:blipFill>
-          <a:blip r:embed="rId3">
-            <a:extLst>
-              <a:ext uri="{28A0092B-C50C-407E-A947-70E740481C1C}">
-                <a14:useLocalDpi xmlns:a14="http://schemas.microsoft.com/office/drawing/2010/main" val="0"/>
-              </a:ext>
-            </a:extLst>
-          </a:blip>
-          <a:srcRect/>
-          <a:stretch>
-            <a:fillRect/>
-          </a:stretch>
-        </p:blipFill>
-        <p:spPr bwMode="auto">
-          <a:xfrm>
-            <a:off x="1730091" y="726594"/>
-            <a:ext cx="5762400" cy="4355726"/>
-          </a:xfrm>
-          <a:prstGeom prst="rect">
-            <a:avLst/>
-          </a:prstGeom>
-          <a:noFill/>
-          <a:extLst>
-            <a:ext uri="{909E8E84-426E-40DD-AFC4-6F175D3DCCD1}">
-              <a14:hiddenFill xmlns:a14="http://schemas.microsoft.com/office/drawing/2010/main">
-                <a:solidFill>
-                  <a:srgbClr val="FFFFFF"/>
-                </a:solidFill>
-              </a14:hiddenFill>
-            </a:ext>
-          </a:extLst>
-        </p:spPr>
-      </p:pic>
       <p:sp>
         <p:nvSpPr>
           <p:cNvPr id="5" name="Google Shape;302;p43">
@@ -11439,6 +11428,45 @@
           </a:ln>
         </p:spPr>
       </p:cxnSp>
+      <p:pic>
+        <p:nvPicPr>
+          <p:cNvPr id="8" name="Picture 7">
+            <a:extLst>
+              <a:ext uri="{FF2B5EF4-FFF2-40B4-BE49-F238E27FC236}">
+                <a16:creationId xmlns:a16="http://schemas.microsoft.com/office/drawing/2014/main" id="{4649EB83-A67A-4A6E-8912-20EBBD649174}"/>
+              </a:ext>
+            </a:extLst>
+          </p:cNvPr>
+          <p:cNvPicPr/>
+          <p:nvPr/>
+        </p:nvPicPr>
+        <p:blipFill>
+          <a:blip r:embed="rId3" cstate="print">
+            <a:extLst>
+              <a:ext uri="{28A0092B-C50C-407E-A947-70E740481C1C}">
+                <a14:useLocalDpi xmlns:a14="http://schemas.microsoft.com/office/drawing/2010/main" val="0"/>
+              </a:ext>
+            </a:extLst>
+          </a:blip>
+          <a:srcRect/>
+          <a:stretch>
+            <a:fillRect/>
+          </a:stretch>
+        </p:blipFill>
+        <p:spPr bwMode="auto">
+          <a:xfrm>
+            <a:off x="1734821" y="864395"/>
+            <a:ext cx="5732667" cy="4093366"/>
+          </a:xfrm>
+          <a:prstGeom prst="rect">
+            <a:avLst/>
+          </a:prstGeom>
+          <a:noFill/>
+          <a:ln>
+            <a:noFill/>
+          </a:ln>
+        </p:spPr>
+      </p:pic>
     </p:spTree>
     <p:extLst>
       <p:ext uri="{BB962C8B-B14F-4D97-AF65-F5344CB8AC3E}">
@@ -11556,7 +11584,7 @@
         </p:nvSpPr>
         <p:spPr>
           <a:xfrm>
-            <a:off x="1705088" y="657"/>
+            <a:off x="1690800" y="657"/>
             <a:ext cx="5762400" cy="699900"/>
           </a:xfrm>
           <a:prstGeom prst="rect">
@@ -11821,7 +11849,7 @@
           <a:p>
             <a:r>
               <a:rPr lang="en-US"/>
-              <a:t>Minterm class diagram</a:t>
+              <a:t>class diagram for minterm</a:t>
             </a:r>
           </a:p>
         </p:txBody>
@@ -11898,45 +11926,6 @@
           <a:chExt cx="0" cy="0"/>
         </a:xfrm>
       </p:grpSpPr>
-      <p:pic>
-        <p:nvPicPr>
-          <p:cNvPr id="8" name="Picture 7">
-            <a:extLst>
-              <a:ext uri="{FF2B5EF4-FFF2-40B4-BE49-F238E27FC236}">
-                <a16:creationId xmlns:a16="http://schemas.microsoft.com/office/drawing/2014/main" id="{62A6A26E-8A0A-4652-A0FF-AA34758A126B}"/>
-              </a:ext>
-            </a:extLst>
-          </p:cNvPr>
-          <p:cNvPicPr/>
-          <p:nvPr/>
-        </p:nvPicPr>
-        <p:blipFill>
-          <a:blip r:embed="rId3" cstate="print">
-            <a:extLst>
-              <a:ext uri="{28A0092B-C50C-407E-A947-70E740481C1C}">
-                <a14:useLocalDpi xmlns:a14="http://schemas.microsoft.com/office/drawing/2010/main" val="0"/>
-              </a:ext>
-            </a:extLst>
-          </a:blip>
-          <a:srcRect/>
-          <a:stretch>
-            <a:fillRect/>
-          </a:stretch>
-        </p:blipFill>
-        <p:spPr bwMode="auto">
-          <a:xfrm>
-            <a:off x="1299470" y="741370"/>
-            <a:ext cx="6545058" cy="3758724"/>
-          </a:xfrm>
-          <a:prstGeom prst="rect">
-            <a:avLst/>
-          </a:prstGeom>
-          <a:noFill/>
-          <a:ln>
-            <a:noFill/>
-          </a:ln>
-        </p:spPr>
-      </p:pic>
       <p:sp>
         <p:nvSpPr>
           <p:cNvPr id="9" name="Google Shape;302;p43">
@@ -12218,7 +12207,7 @@
           <a:p>
             <a:r>
               <a:rPr lang="en-US"/>
-              <a:t>Column class diagram</a:t>
+              <a:t>class diagram for column</a:t>
             </a:r>
           </a:p>
         </p:txBody>
@@ -12257,6 +12246,45 @@
           </a:ln>
         </p:spPr>
       </p:cxnSp>
+      <p:pic>
+        <p:nvPicPr>
+          <p:cNvPr id="5" name="Picture 4">
+            <a:extLst>
+              <a:ext uri="{FF2B5EF4-FFF2-40B4-BE49-F238E27FC236}">
+                <a16:creationId xmlns:a16="http://schemas.microsoft.com/office/drawing/2014/main" id="{8EBA4AE3-1284-4E24-A29C-268C257471DF}"/>
+              </a:ext>
+            </a:extLst>
+          </p:cNvPr>
+          <p:cNvPicPr/>
+          <p:nvPr/>
+        </p:nvPicPr>
+        <p:blipFill>
+          <a:blip r:embed="rId3" cstate="print">
+            <a:extLst>
+              <a:ext uri="{28A0092B-C50C-407E-A947-70E740481C1C}">
+                <a14:useLocalDpi xmlns:a14="http://schemas.microsoft.com/office/drawing/2010/main" val="0"/>
+              </a:ext>
+            </a:extLst>
+          </a:blip>
+          <a:srcRect/>
+          <a:stretch>
+            <a:fillRect/>
+          </a:stretch>
+        </p:blipFill>
+        <p:spPr bwMode="auto">
+          <a:xfrm>
+            <a:off x="1374616" y="827405"/>
+            <a:ext cx="6394767" cy="3937477"/>
+          </a:xfrm>
+          <a:prstGeom prst="rect">
+            <a:avLst/>
+          </a:prstGeom>
+          <a:noFill/>
+          <a:ln>
+            <a:noFill/>
+          </a:ln>
+        </p:spPr>
+      </p:pic>
     </p:spTree>
     <p:extLst>
       <p:ext uri="{BB962C8B-B14F-4D97-AF65-F5344CB8AC3E}">
@@ -12576,7 +12604,7 @@
           <a:p>
             <a:r>
               <a:rPr lang="en-US"/>
-              <a:t>table class diagram</a:t>
+              <a:t>class diagram for table </a:t>
             </a:r>
           </a:p>
         </p:txBody>
@@ -12617,10 +12645,47 @@
       </p:cxnSp>
       <p:pic>
         <p:nvPicPr>
-          <p:cNvPr id="5" name="Picture 4">
+          <p:cNvPr id="6" name="Picture 5">
             <a:extLst>
               <a:ext uri="{FF2B5EF4-FFF2-40B4-BE49-F238E27FC236}">
-                <a16:creationId xmlns:a16="http://schemas.microsoft.com/office/drawing/2014/main" id="{6984A6E7-12FD-44AD-97E6-CD85A0F7EB6A}"/>
+                <a16:creationId xmlns:a16="http://schemas.microsoft.com/office/drawing/2014/main" id="{A6102D12-5608-4CCD-ACBD-12389179EE2A}"/>
+              </a:ext>
+            </a:extLst>
+          </p:cNvPr>
+          <p:cNvPicPr/>
+          <p:nvPr/>
+        </p:nvPicPr>
+        <p:blipFill rotWithShape="1">
+          <a:blip r:embed="rId3" cstate="print">
+            <a:extLst>
+              <a:ext uri="{28A0092B-C50C-407E-A947-70E740481C1C}">
+                <a14:useLocalDpi xmlns:a14="http://schemas.microsoft.com/office/drawing/2010/main" val="0"/>
+              </a:ext>
+            </a:extLst>
+          </a:blip>
+          <a:srcRect l="13168" t="15279" r="24243" b="10775"/>
+          <a:stretch/>
+        </p:blipFill>
+        <p:spPr bwMode="auto">
+          <a:xfrm>
+            <a:off x="2896790" y="1186144"/>
+            <a:ext cx="3350419" cy="3042485"/>
+          </a:xfrm>
+          <a:prstGeom prst="rect">
+            <a:avLst/>
+          </a:prstGeom>
+          <a:noFill/>
+          <a:ln>
+            <a:noFill/>
+          </a:ln>
+        </p:spPr>
+      </p:pic>
+      <p:pic>
+        <p:nvPicPr>
+          <p:cNvPr id="7" name="Picture 6">
+            <a:extLst>
+              <a:ext uri="{FF2B5EF4-FFF2-40B4-BE49-F238E27FC236}">
+                <a16:creationId xmlns:a16="http://schemas.microsoft.com/office/drawing/2014/main" id="{AB5426D2-F9F4-4967-80E7-96473AC0FAF9}"/>
               </a:ext>
             </a:extLst>
           </p:cNvPr>
@@ -12628,7 +12693,7 @@
           <p:nvPr/>
         </p:nvPicPr>
         <p:blipFill>
-          <a:blip r:embed="rId3" cstate="print">
+          <a:blip r:embed="rId4">
             <a:extLst>
               <a:ext uri="{28A0092B-C50C-407E-A947-70E740481C1C}">
                 <a14:useLocalDpi xmlns:a14="http://schemas.microsoft.com/office/drawing/2010/main" val="0"/>
@@ -12642,16 +12707,103 @@
         </p:blipFill>
         <p:spPr bwMode="auto">
           <a:xfrm>
-            <a:off x="1921669" y="798369"/>
-            <a:ext cx="5329237" cy="3909359"/>
+            <a:off x="4471986" y="1612884"/>
+            <a:ext cx="3940095" cy="2189004"/>
           </a:xfrm>
           <a:prstGeom prst="rect">
             <a:avLst/>
           </a:prstGeom>
           <a:noFill/>
           <a:ln>
-            <a:noFill/>
+            <a:solidFill>
+              <a:schemeClr val="tx1"/>
+            </a:solidFill>
           </a:ln>
+        </p:spPr>
+      </p:pic>
+      <p:pic>
+        <p:nvPicPr>
+          <p:cNvPr id="8" name="Picture 7">
+            <a:extLst>
+              <a:ext uri="{FF2B5EF4-FFF2-40B4-BE49-F238E27FC236}">
+                <a16:creationId xmlns:a16="http://schemas.microsoft.com/office/drawing/2014/main" id="{2BF61612-5A0A-4081-BFE4-6338E91E613C}"/>
+              </a:ext>
+            </a:extLst>
+          </p:cNvPr>
+          <p:cNvPicPr/>
+          <p:nvPr/>
+        </p:nvPicPr>
+        <p:blipFill>
+          <a:blip r:embed="rId5">
+            <a:extLst>
+              <a:ext uri="{28A0092B-C50C-407E-A947-70E740481C1C}">
+                <a14:useLocalDpi xmlns:a14="http://schemas.microsoft.com/office/drawing/2010/main" val="0"/>
+              </a:ext>
+            </a:extLst>
+          </a:blip>
+          <a:srcRect/>
+          <a:stretch>
+            <a:fillRect/>
+          </a:stretch>
+        </p:blipFill>
+        <p:spPr bwMode="auto">
+          <a:xfrm>
+            <a:off x="4215723" y="3417233"/>
+            <a:ext cx="4452620" cy="929640"/>
+          </a:xfrm>
+          <a:prstGeom prst="rect">
+            <a:avLst/>
+          </a:prstGeom>
+          <a:noFill/>
+          <a:ln>
+            <a:solidFill>
+              <a:schemeClr val="tx1"/>
+            </a:solidFill>
+          </a:ln>
+        </p:spPr>
+      </p:pic>
+      <p:pic>
+        <p:nvPicPr>
+          <p:cNvPr id="12" name="Picture 11">
+            <a:extLst>
+              <a:ext uri="{FF2B5EF4-FFF2-40B4-BE49-F238E27FC236}">
+                <a16:creationId xmlns:a16="http://schemas.microsoft.com/office/drawing/2014/main" id="{EB463F74-8934-449E-8657-E593985C1DB4}"/>
+              </a:ext>
+            </a:extLst>
+          </p:cNvPr>
+          <p:cNvPicPr/>
+          <p:nvPr/>
+        </p:nvPicPr>
+        <p:blipFill rotWithShape="1">
+          <a:blip r:embed="rId6">
+            <a:extLst>
+              <a:ext uri="{28A0092B-C50C-407E-A947-70E740481C1C}">
+                <a14:useLocalDpi xmlns:a14="http://schemas.microsoft.com/office/drawing/2010/main" val="0"/>
+              </a:ext>
+            </a:extLst>
+          </a:blip>
+          <a:srcRect t="10423" b="3585"/>
+          <a:stretch/>
+        </p:blipFill>
+        <p:spPr bwMode="auto">
+          <a:xfrm>
+            <a:off x="4294430" y="2159876"/>
+            <a:ext cx="4578985" cy="1008993"/>
+          </a:xfrm>
+          <a:prstGeom prst="rect">
+            <a:avLst/>
+          </a:prstGeom>
+          <a:noFill/>
+          <a:ln>
+            <a:solidFill>
+              <a:schemeClr val="tx1"/>
+            </a:solidFill>
+          </a:ln>
+          <a:extLst>
+            <a:ext uri="{53640926-AAD7-44D8-BBD7-CCE9431645EC}">
+              <a14:shadowObscured xmlns:a14="http://schemas.microsoft.com/office/drawing/2010/main"/>
+            </a:ext>
+          </a:extLst>
         </p:spPr>
       </p:pic>
     </p:spTree>
@@ -12664,6 +12816,309 @@
   <p:clrMapOvr>
     <a:masterClrMapping/>
   </p:clrMapOvr>
+  <p:timing>
+    <p:tnLst>
+      <p:par>
+        <p:cTn id="1" dur="indefinite" restart="never" nodeType="tmRoot">
+          <p:childTnLst>
+            <p:seq concurrent="1" nextAc="seek">
+              <p:cTn id="2" dur="indefinite" nodeType="mainSeq">
+                <p:childTnLst>
+                  <p:par>
+                    <p:cTn id="3" fill="hold">
+                      <p:stCondLst>
+                        <p:cond delay="indefinite"/>
+                      </p:stCondLst>
+                      <p:childTnLst>
+                        <p:par>
+                          <p:cTn id="4" fill="hold">
+                            <p:stCondLst>
+                              <p:cond delay="0"/>
+                            </p:stCondLst>
+                            <p:childTnLst>
+                              <p:par>
+                                <p:cTn id="5" presetID="42" presetClass="path" presetSubtype="0" accel="50000" decel="50000" fill="hold" nodeType="clickEffect">
+                                  <p:stCondLst>
+                                    <p:cond delay="0"/>
+                                  </p:stCondLst>
+                                  <p:childTnLst>
+                                    <p:animMotion origin="layout" path="M 0 -4.5679E-6 L -0.23993 -4.5679E-6 " pathEditMode="relative" rAng="0" ptsTypes="AA">
+                                      <p:cBhvr>
+                                        <p:cTn id="6" dur="800" fill="hold"/>
+                                        <p:tgtEl>
+                                          <p:spTgt spid="6"/>
+                                        </p:tgtEl>
+                                        <p:attrNameLst>
+                                          <p:attrName>ppt_x</p:attrName>
+                                          <p:attrName>ppt_y</p:attrName>
+                                        </p:attrNameLst>
+                                      </p:cBhvr>
+                                      <p:rCtr x="-11997" y="0"/>
+                                    </p:animMotion>
+                                  </p:childTnLst>
+                                </p:cTn>
+                              </p:par>
+                              <p:par>
+                                <p:cTn id="7" presetID="10" presetClass="entr" presetSubtype="0" fill="hold" nodeType="withEffect">
+                                  <p:stCondLst>
+                                    <p:cond delay="0"/>
+                                  </p:stCondLst>
+                                  <p:childTnLst>
+                                    <p:set>
+                                      <p:cBhvr>
+                                        <p:cTn id="8" dur="1" fill="hold">
+                                          <p:stCondLst>
+                                            <p:cond delay="0"/>
+                                          </p:stCondLst>
+                                        </p:cTn>
+                                        <p:tgtEl>
+                                          <p:spTgt spid="7"/>
+                                        </p:tgtEl>
+                                        <p:attrNameLst>
+                                          <p:attrName>style.visibility</p:attrName>
+                                        </p:attrNameLst>
+                                      </p:cBhvr>
+                                      <p:to>
+                                        <p:strVal val="visible"/>
+                                      </p:to>
+                                    </p:set>
+                                    <p:animEffect transition="in" filter="fade">
+                                      <p:cBhvr>
+                                        <p:cTn id="9" dur="500"/>
+                                        <p:tgtEl>
+                                          <p:spTgt spid="7"/>
+                                        </p:tgtEl>
+                                      </p:cBhvr>
+                                    </p:animEffect>
+                                  </p:childTnLst>
+                                </p:cTn>
+                              </p:par>
+                            </p:childTnLst>
+                          </p:cTn>
+                        </p:par>
+                      </p:childTnLst>
+                    </p:cTn>
+                  </p:par>
+                  <p:par>
+                    <p:cTn id="10" fill="hold">
+                      <p:stCondLst>
+                        <p:cond delay="indefinite"/>
+                      </p:stCondLst>
+                      <p:childTnLst>
+                        <p:par>
+                          <p:cTn id="11" fill="hold">
+                            <p:stCondLst>
+                              <p:cond delay="0"/>
+                            </p:stCondLst>
+                            <p:childTnLst>
+                              <p:par>
+                                <p:cTn id="12" presetID="42" presetClass="path" presetSubtype="0" accel="50000" decel="50000" fill="hold" nodeType="clickEffect">
+                                  <p:stCondLst>
+                                    <p:cond delay="0"/>
+                                  </p:stCondLst>
+                                  <p:childTnLst>
+                                    <p:animMotion origin="layout" path="M 0.00035 -4.5679E-6 L 0.00018 -0.14012 " pathEditMode="relative" rAng="0" ptsTypes="AA">
+                                      <p:cBhvr>
+                                        <p:cTn id="13" dur="800" fill="hold"/>
+                                        <p:tgtEl>
+                                          <p:spTgt spid="7"/>
+                                        </p:tgtEl>
+                                        <p:attrNameLst>
+                                          <p:attrName>ppt_x</p:attrName>
+                                          <p:attrName>ppt_y</p:attrName>
+                                        </p:attrNameLst>
+                                      </p:cBhvr>
+                                      <p:rCtr x="-17" y="-7006"/>
+                                    </p:animMotion>
+                                  </p:childTnLst>
+                                </p:cTn>
+                              </p:par>
+                              <p:par>
+                                <p:cTn id="14" presetID="10" presetClass="entr" presetSubtype="0" fill="hold" nodeType="withEffect">
+                                  <p:stCondLst>
+                                    <p:cond delay="0"/>
+                                  </p:stCondLst>
+                                  <p:childTnLst>
+                                    <p:set>
+                                      <p:cBhvr>
+                                        <p:cTn id="15" dur="1" fill="hold">
+                                          <p:stCondLst>
+                                            <p:cond delay="0"/>
+                                          </p:stCondLst>
+                                        </p:cTn>
+                                        <p:tgtEl>
+                                          <p:spTgt spid="8"/>
+                                        </p:tgtEl>
+                                        <p:attrNameLst>
+                                          <p:attrName>style.visibility</p:attrName>
+                                        </p:attrNameLst>
+                                      </p:cBhvr>
+                                      <p:to>
+                                        <p:strVal val="visible"/>
+                                      </p:to>
+                                    </p:set>
+                                    <p:animEffect transition="in" filter="fade">
+                                      <p:cBhvr>
+                                        <p:cTn id="16" dur="500"/>
+                                        <p:tgtEl>
+                                          <p:spTgt spid="8"/>
+                                        </p:tgtEl>
+                                      </p:cBhvr>
+                                    </p:animEffect>
+                                  </p:childTnLst>
+                                </p:cTn>
+                              </p:par>
+                            </p:childTnLst>
+                          </p:cTn>
+                        </p:par>
+                      </p:childTnLst>
+                    </p:cTn>
+                  </p:par>
+                  <p:par>
+                    <p:cTn id="17" fill="hold">
+                      <p:stCondLst>
+                        <p:cond delay="indefinite"/>
+                      </p:stCondLst>
+                      <p:childTnLst>
+                        <p:par>
+                          <p:cTn id="18" fill="hold">
+                            <p:stCondLst>
+                              <p:cond delay="0"/>
+                            </p:stCondLst>
+                            <p:childTnLst>
+                              <p:par>
+                                <p:cTn id="19" presetID="10" presetClass="entr" presetSubtype="0" fill="hold" nodeType="clickEffect">
+                                  <p:stCondLst>
+                                    <p:cond delay="0"/>
+                                  </p:stCondLst>
+                                  <p:childTnLst>
+                                    <p:set>
+                                      <p:cBhvr>
+                                        <p:cTn id="20" dur="1" fill="hold">
+                                          <p:stCondLst>
+                                            <p:cond delay="0"/>
+                                          </p:stCondLst>
+                                        </p:cTn>
+                                        <p:tgtEl>
+                                          <p:spTgt spid="12"/>
+                                        </p:tgtEl>
+                                        <p:attrNameLst>
+                                          <p:attrName>style.visibility</p:attrName>
+                                        </p:attrNameLst>
+                                      </p:cBhvr>
+                                      <p:to>
+                                        <p:strVal val="visible"/>
+                                      </p:to>
+                                    </p:set>
+                                    <p:animEffect transition="in" filter="fade">
+                                      <p:cBhvr>
+                                        <p:cTn id="21" dur="500"/>
+                                        <p:tgtEl>
+                                          <p:spTgt spid="12"/>
+                                        </p:tgtEl>
+                                      </p:cBhvr>
+                                    </p:animEffect>
+                                  </p:childTnLst>
+                                </p:cTn>
+                              </p:par>
+                              <p:par>
+                                <p:cTn id="22" presetID="10" presetClass="exit" presetSubtype="0" fill="hold" nodeType="withEffect">
+                                  <p:stCondLst>
+                                    <p:cond delay="0"/>
+                                  </p:stCondLst>
+                                  <p:childTnLst>
+                                    <p:animEffect transition="out" filter="fade">
+                                      <p:cBhvr>
+                                        <p:cTn id="23" dur="500"/>
+                                        <p:tgtEl>
+                                          <p:spTgt spid="7"/>
+                                        </p:tgtEl>
+                                      </p:cBhvr>
+                                    </p:animEffect>
+                                    <p:set>
+                                      <p:cBhvr>
+                                        <p:cTn id="24" dur="1" fill="hold">
+                                          <p:stCondLst>
+                                            <p:cond delay="499"/>
+                                          </p:stCondLst>
+                                        </p:cTn>
+                                        <p:tgtEl>
+                                          <p:spTgt spid="7"/>
+                                        </p:tgtEl>
+                                        <p:attrNameLst>
+                                          <p:attrName>style.visibility</p:attrName>
+                                        </p:attrNameLst>
+                                      </p:cBhvr>
+                                      <p:to>
+                                        <p:strVal val="hidden"/>
+                                      </p:to>
+                                    </p:set>
+                                  </p:childTnLst>
+                                </p:cTn>
+                              </p:par>
+                              <p:par>
+                                <p:cTn id="25" presetID="10" presetClass="exit" presetSubtype="0" fill="hold" nodeType="withEffect">
+                                  <p:stCondLst>
+                                    <p:cond delay="0"/>
+                                  </p:stCondLst>
+                                  <p:childTnLst>
+                                    <p:animEffect transition="out" filter="fade">
+                                      <p:cBhvr>
+                                        <p:cTn id="26" dur="500"/>
+                                        <p:tgtEl>
+                                          <p:spTgt spid="8"/>
+                                        </p:tgtEl>
+                                      </p:cBhvr>
+                                    </p:animEffect>
+                                    <p:set>
+                                      <p:cBhvr>
+                                        <p:cTn id="27" dur="1" fill="hold">
+                                          <p:stCondLst>
+                                            <p:cond delay="499"/>
+                                          </p:stCondLst>
+                                        </p:cTn>
+                                        <p:tgtEl>
+                                          <p:spTgt spid="8"/>
+                                        </p:tgtEl>
+                                        <p:attrNameLst>
+                                          <p:attrName>style.visibility</p:attrName>
+                                        </p:attrNameLst>
+                                      </p:cBhvr>
+                                      <p:to>
+                                        <p:strVal val="hidden"/>
+                                      </p:to>
+                                    </p:set>
+                                  </p:childTnLst>
+                                </p:cTn>
+                              </p:par>
+                            </p:childTnLst>
+                          </p:cTn>
+                        </p:par>
+                      </p:childTnLst>
+                    </p:cTn>
+                  </p:par>
+                </p:childTnLst>
+              </p:cTn>
+              <p:prevCondLst>
+                <p:cond evt="onPrev" delay="0">
+                  <p:tgtEl>
+                    <p:sldTgt/>
+                  </p:tgtEl>
+                </p:cond>
+              </p:prevCondLst>
+              <p:nextCondLst>
+                <p:cond evt="onNext" delay="0">
+                  <p:tgtEl>
+                    <p:sldTgt/>
+                  </p:tgtEl>
+                </p:cond>
+              </p:nextCondLst>
+            </p:seq>
+          </p:childTnLst>
+        </p:cTn>
+      </p:par>
+    </p:tnLst>
+  </p:timing>
 </p:sld>
 </file>
 
@@ -12973,7 +13428,7 @@
           <a:p>
             <a:r>
               <a:rPr lang="en-US"/>
-              <a:t>Output class diagram</a:t>
+              <a:t>class diagram for output</a:t>
             </a:r>
           </a:p>
         </p:txBody>
@@ -13014,10 +13469,10 @@
       </p:cxnSp>
       <p:pic>
         <p:nvPicPr>
-          <p:cNvPr id="6" name="Picture 5">
+          <p:cNvPr id="5" name="Picture 4">
             <a:extLst>
               <a:ext uri="{FF2B5EF4-FFF2-40B4-BE49-F238E27FC236}">
-                <a16:creationId xmlns:a16="http://schemas.microsoft.com/office/drawing/2014/main" id="{0540DB28-6D2B-4FA9-8EF3-60C19633F772}"/>
+                <a16:creationId xmlns:a16="http://schemas.microsoft.com/office/drawing/2014/main" id="{104B41FE-D849-44DB-865F-B5502998CA54}"/>
               </a:ext>
             </a:extLst>
           </p:cNvPr>
@@ -13032,49 +13487,212 @@
               </a:ext>
             </a:extLst>
           </a:blip>
-          <a:srcRect l="1079" t="1562" r="3406" b="12591"/>
+          <a:srcRect l="3354" t="6085" r="5774" b="4677"/>
           <a:stretch/>
         </p:blipFill>
         <p:spPr bwMode="auto">
           <a:xfrm>
-            <a:off x="1739820" y="743124"/>
-            <a:ext cx="5664359" cy="3742683"/>
+            <a:off x="1993106" y="951654"/>
+            <a:ext cx="5236369" cy="3515710"/>
           </a:xfrm>
           <a:prstGeom prst="rect">
             <a:avLst/>
           </a:prstGeom>
           <a:noFill/>
-          <a:ln w="127" cap="flat" cmpd="sng" algn="ctr">
-            <a:solidFill>
-              <a:sysClr val="windowText" lastClr="000000"/>
-            </a:solidFill>
-            <a:prstDash val="solid"/>
-            <a:round/>
-            <a:headEnd type="none" w="med" len="med"/>
-            <a:tailEnd type="none" w="med" len="med"/>
+          <a:ln>
+            <a:noFill/>
+          </a:ln>
+        </p:spPr>
+      </p:pic>
+      <p:pic>
+        <p:nvPicPr>
+          <p:cNvPr id="8" name="Picture 7">
             <a:extLst>
-              <a:ext uri="{C807C97D-BFC1-408E-A445-0C87EB9F89A2}">
-                <ask:lineSketchStyleProps xmlns:ask="http://schemas.microsoft.com/office/drawing/2018/sketchyshapes" sd="0">
-                  <a:custGeom>
-                    <a:avLst/>
-                    <a:gdLst/>
-                    <a:ahLst/>
-                    <a:cxnLst/>
-                    <a:rect l="0" t="0" r="0" b="0"/>
-                    <a:pathLst/>
-                  </a:custGeom>
-                  <ask:type/>
-                </ask:lineSketchStyleProps>
+              <a:ext uri="{FF2B5EF4-FFF2-40B4-BE49-F238E27FC236}">
+                <a16:creationId xmlns:a16="http://schemas.microsoft.com/office/drawing/2014/main" id="{A7A2B69D-19DD-4C70-8DDC-2124419F1FA8}"/>
               </a:ext>
             </a:extLst>
+          </p:cNvPr>
+          <p:cNvPicPr/>
+          <p:nvPr/>
+        </p:nvPicPr>
+        <p:blipFill rotWithShape="1">
+          <a:blip r:embed="rId4">
+            <a:extLst>
+              <a:ext uri="{28A0092B-C50C-407E-A947-70E740481C1C}">
+                <a14:useLocalDpi xmlns:a14="http://schemas.microsoft.com/office/drawing/2010/main" val="0"/>
+              </a:ext>
+            </a:extLst>
+          </a:blip>
+          <a:srcRect r="2826"/>
+          <a:stretch/>
+        </p:blipFill>
+        <p:spPr bwMode="auto">
+          <a:xfrm>
+            <a:off x="2120117" y="1527100"/>
+            <a:ext cx="4903766" cy="2294255"/>
+          </a:xfrm>
+          <a:prstGeom prst="rect">
+            <a:avLst/>
+          </a:prstGeom>
+          <a:noFill/>
+          <a:ln>
+            <a:solidFill>
+              <a:schemeClr val="tx1"/>
+            </a:solidFill>
           </a:ln>
-          <a:extLst>
-            <a:ext uri="{53640926-AAD7-44D8-BBD7-CCE9431645EC}">
-              <a14:shadowObscured xmlns:a14="http://schemas.microsoft.com/office/drawing/2010/main"/>
-            </a:ext>
-          </a:extLst>
         </p:spPr>
       </p:pic>
+      <p:pic>
+        <p:nvPicPr>
+          <p:cNvPr id="13" name="Picture 12">
+            <a:extLst>
+              <a:ext uri="{FF2B5EF4-FFF2-40B4-BE49-F238E27FC236}">
+                <a16:creationId xmlns:a16="http://schemas.microsoft.com/office/drawing/2014/main" id="{DFC2805F-330E-4E63-BF7A-B9C6274552FC}"/>
+              </a:ext>
+            </a:extLst>
+          </p:cNvPr>
+          <p:cNvPicPr/>
+          <p:nvPr/>
+        </p:nvPicPr>
+        <p:blipFill>
+          <a:blip r:embed="rId5">
+            <a:extLst>
+              <a:ext uri="{28A0092B-C50C-407E-A947-70E740481C1C}">
+                <a14:useLocalDpi xmlns:a14="http://schemas.microsoft.com/office/drawing/2010/main" val="0"/>
+              </a:ext>
+            </a:extLst>
+          </a:blip>
+          <a:srcRect/>
+          <a:stretch>
+            <a:fillRect/>
+          </a:stretch>
+        </p:blipFill>
+        <p:spPr bwMode="auto">
+          <a:xfrm>
+            <a:off x="1965722" y="1400457"/>
+            <a:ext cx="5206365" cy="2618105"/>
+          </a:xfrm>
+          <a:prstGeom prst="rect">
+            <a:avLst/>
+          </a:prstGeom>
+          <a:noFill/>
+          <a:ln>
+            <a:solidFill>
+              <a:schemeClr val="tx1"/>
+            </a:solidFill>
+          </a:ln>
+        </p:spPr>
+      </p:pic>
+      <p:grpSp>
+        <p:nvGrpSpPr>
+          <p:cNvPr id="2" name="Group 1">
+            <a:extLst>
+              <a:ext uri="{FF2B5EF4-FFF2-40B4-BE49-F238E27FC236}">
+                <a16:creationId xmlns:a16="http://schemas.microsoft.com/office/drawing/2014/main" id="{6381C1A9-D4B8-492A-A6D8-C25600F015A8}"/>
+              </a:ext>
+            </a:extLst>
+          </p:cNvPr>
+          <p:cNvGrpSpPr/>
+          <p:nvPr/>
+        </p:nvGrpSpPr>
+        <p:grpSpPr>
+          <a:xfrm>
+            <a:off x="1965722" y="1693246"/>
+            <a:ext cx="5210175" cy="2128109"/>
+            <a:chOff x="268383" y="1024975"/>
+            <a:chExt cx="5210175" cy="2128109"/>
+          </a:xfrm>
+        </p:grpSpPr>
+        <p:pic>
+          <p:nvPicPr>
+            <p:cNvPr id="14" name="Picture 13" descr="Description: Graphical user interface, text, application&#10;&#10;Description automatically generated">
+              <a:extLst>
+                <a:ext uri="{FF2B5EF4-FFF2-40B4-BE49-F238E27FC236}">
+                  <a16:creationId xmlns:a16="http://schemas.microsoft.com/office/drawing/2014/main" id="{02C913C2-7324-437A-9621-877116487B83}"/>
+                </a:ext>
+              </a:extLst>
+            </p:cNvPr>
+            <p:cNvPicPr/>
+            <p:nvPr/>
+          </p:nvPicPr>
+          <p:blipFill rotWithShape="1">
+            <a:blip r:embed="rId6">
+              <a:extLst>
+                <a:ext uri="{28A0092B-C50C-407E-A947-70E740481C1C}">
+                  <a14:useLocalDpi xmlns:a14="http://schemas.microsoft.com/office/drawing/2010/main" val="0"/>
+                </a:ext>
+              </a:extLst>
+            </a:blip>
+            <a:srcRect t="1" b="38031"/>
+            <a:stretch/>
+          </p:blipFill>
+          <p:spPr bwMode="auto">
+            <a:xfrm>
+              <a:off x="268383" y="1024975"/>
+              <a:ext cx="5210175" cy="1868724"/>
+            </a:xfrm>
+            <a:prstGeom prst="rect">
+              <a:avLst/>
+            </a:prstGeom>
+            <a:noFill/>
+            <a:ln>
+              <a:solidFill>
+                <a:schemeClr val="tx1"/>
+              </a:solidFill>
+            </a:ln>
+            <a:extLst>
+              <a:ext uri="{53640926-AAD7-44D8-BBD7-CCE9431645EC}">
+                <a14:shadowObscured xmlns:a14="http://schemas.microsoft.com/office/drawing/2010/main"/>
+              </a:ext>
+            </a:extLst>
+          </p:spPr>
+        </p:pic>
+        <p:pic>
+          <p:nvPicPr>
+            <p:cNvPr id="15" name="Picture 14" descr="Description: Graphical user interface, text, application&#10;&#10;Description automatically generated">
+              <a:extLst>
+                <a:ext uri="{FF2B5EF4-FFF2-40B4-BE49-F238E27FC236}">
+                  <a16:creationId xmlns:a16="http://schemas.microsoft.com/office/drawing/2014/main" id="{1FE1CF9A-0820-4EFC-A44B-ACD6671AF6B1}"/>
+                </a:ext>
+              </a:extLst>
+            </p:cNvPr>
+            <p:cNvPicPr/>
+            <p:nvPr/>
+          </p:nvPicPr>
+          <p:blipFill rotWithShape="1">
+            <a:blip r:embed="rId6">
+              <a:extLst>
+                <a:ext uri="{28A0092B-C50C-407E-A947-70E740481C1C}">
+                  <a14:useLocalDpi xmlns:a14="http://schemas.microsoft.com/office/drawing/2010/main" val="0"/>
+                </a:ext>
+              </a:extLst>
+            </a:blip>
+            <a:srcRect t="93906" b="-1"/>
+            <a:stretch/>
+          </p:blipFill>
+          <p:spPr bwMode="auto">
+            <a:xfrm>
+              <a:off x="268383" y="2969289"/>
+              <a:ext cx="5210175" cy="183795"/>
+            </a:xfrm>
+            <a:prstGeom prst="rect">
+              <a:avLst/>
+            </a:prstGeom>
+            <a:noFill/>
+            <a:ln>
+              <a:solidFill>
+                <a:schemeClr val="tx1"/>
+              </a:solidFill>
+            </a:ln>
+            <a:extLst>
+              <a:ext uri="{53640926-AAD7-44D8-BBD7-CCE9431645EC}">
+                <a14:shadowObscured xmlns:a14="http://schemas.microsoft.com/office/drawing/2010/main"/>
+              </a:ext>
+            </a:extLst>
+          </p:spPr>
+        </p:pic>
+      </p:grpSp>
     </p:spTree>
     <p:extLst>
       <p:ext uri="{BB962C8B-B14F-4D97-AF65-F5344CB8AC3E}">
@@ -13085,6 +13703,300 @@
   <p:clrMapOvr>
     <a:masterClrMapping/>
   </p:clrMapOvr>
+  <p:timing>
+    <p:tnLst>
+      <p:par>
+        <p:cTn id="1" dur="indefinite" restart="never" nodeType="tmRoot">
+          <p:childTnLst>
+            <p:seq concurrent="1" nextAc="seek">
+              <p:cTn id="2" dur="indefinite" nodeType="mainSeq">
+                <p:childTnLst>
+                  <p:par>
+                    <p:cTn id="3" fill="hold">
+                      <p:stCondLst>
+                        <p:cond delay="indefinite"/>
+                      </p:stCondLst>
+                      <p:childTnLst>
+                        <p:par>
+                          <p:cTn id="4" fill="hold">
+                            <p:stCondLst>
+                              <p:cond delay="0"/>
+                            </p:stCondLst>
+                            <p:childTnLst>
+                              <p:par>
+                                <p:cTn id="5" presetID="10" presetClass="exit" presetSubtype="0" fill="hold" nodeType="clickEffect">
+                                  <p:stCondLst>
+                                    <p:cond delay="0"/>
+                                  </p:stCondLst>
+                                  <p:childTnLst>
+                                    <p:animEffect transition="out" filter="fade">
+                                      <p:cBhvr>
+                                        <p:cTn id="6" dur="500"/>
+                                        <p:tgtEl>
+                                          <p:spTgt spid="5"/>
+                                        </p:tgtEl>
+                                      </p:cBhvr>
+                                    </p:animEffect>
+                                    <p:set>
+                                      <p:cBhvr>
+                                        <p:cTn id="7" dur="1" fill="hold">
+                                          <p:stCondLst>
+                                            <p:cond delay="499"/>
+                                          </p:stCondLst>
+                                        </p:cTn>
+                                        <p:tgtEl>
+                                          <p:spTgt spid="5"/>
+                                        </p:tgtEl>
+                                        <p:attrNameLst>
+                                          <p:attrName>style.visibility</p:attrName>
+                                        </p:attrNameLst>
+                                      </p:cBhvr>
+                                      <p:to>
+                                        <p:strVal val="hidden"/>
+                                      </p:to>
+                                    </p:set>
+                                  </p:childTnLst>
+                                </p:cTn>
+                              </p:par>
+                              <p:par>
+                                <p:cTn id="8" presetID="10" presetClass="entr" presetSubtype="0" fill="hold" nodeType="withEffect">
+                                  <p:stCondLst>
+                                    <p:cond delay="0"/>
+                                  </p:stCondLst>
+                                  <p:childTnLst>
+                                    <p:set>
+                                      <p:cBhvr>
+                                        <p:cTn id="9" dur="1" fill="hold">
+                                          <p:stCondLst>
+                                            <p:cond delay="0"/>
+                                          </p:stCondLst>
+                                        </p:cTn>
+                                        <p:tgtEl>
+                                          <p:spTgt spid="8"/>
+                                        </p:tgtEl>
+                                        <p:attrNameLst>
+                                          <p:attrName>style.visibility</p:attrName>
+                                        </p:attrNameLst>
+                                      </p:cBhvr>
+                                      <p:to>
+                                        <p:strVal val="visible"/>
+                                      </p:to>
+                                    </p:set>
+                                    <p:animEffect transition="in" filter="fade">
+                                      <p:cBhvr>
+                                        <p:cTn id="10" dur="500"/>
+                                        <p:tgtEl>
+                                          <p:spTgt spid="8"/>
+                                        </p:tgtEl>
+                                      </p:cBhvr>
+                                    </p:animEffect>
+                                  </p:childTnLst>
+                                </p:cTn>
+                              </p:par>
+                            </p:childTnLst>
+                          </p:cTn>
+                        </p:par>
+                      </p:childTnLst>
+                    </p:cTn>
+                  </p:par>
+                  <p:par>
+                    <p:cTn id="11" fill="hold">
+                      <p:stCondLst>
+                        <p:cond delay="indefinite"/>
+                      </p:stCondLst>
+                      <p:childTnLst>
+                        <p:par>
+                          <p:cTn id="12" fill="hold">
+                            <p:stCondLst>
+                              <p:cond delay="0"/>
+                            </p:stCondLst>
+                            <p:childTnLst>
+                              <p:par>
+                                <p:cTn id="13" presetID="10" presetClass="exit" presetSubtype="0" fill="hold" nodeType="clickEffect">
+                                  <p:stCondLst>
+                                    <p:cond delay="0"/>
+                                  </p:stCondLst>
+                                  <p:childTnLst>
+                                    <p:animEffect transition="out" filter="fade">
+                                      <p:cBhvr>
+                                        <p:cTn id="14" dur="500"/>
+                                        <p:tgtEl>
+                                          <p:spTgt spid="8"/>
+                                        </p:tgtEl>
+                                      </p:cBhvr>
+                                    </p:animEffect>
+                                    <p:set>
+                                      <p:cBhvr>
+                                        <p:cTn id="15" dur="1" fill="hold">
+                                          <p:stCondLst>
+                                            <p:cond delay="499"/>
+                                          </p:stCondLst>
+                                        </p:cTn>
+                                        <p:tgtEl>
+                                          <p:spTgt spid="8"/>
+                                        </p:tgtEl>
+                                        <p:attrNameLst>
+                                          <p:attrName>style.visibility</p:attrName>
+                                        </p:attrNameLst>
+                                      </p:cBhvr>
+                                      <p:to>
+                                        <p:strVal val="hidden"/>
+                                      </p:to>
+                                    </p:set>
+                                  </p:childTnLst>
+                                </p:cTn>
+                              </p:par>
+                              <p:par>
+                                <p:cTn id="16" presetID="10" presetClass="entr" presetSubtype="0" fill="hold" nodeType="withEffect">
+                                  <p:stCondLst>
+                                    <p:cond delay="0"/>
+                                  </p:stCondLst>
+                                  <p:childTnLst>
+                                    <p:set>
+                                      <p:cBhvr>
+                                        <p:cTn id="17" dur="1" fill="hold">
+                                          <p:stCondLst>
+                                            <p:cond delay="0"/>
+                                          </p:stCondLst>
+                                        </p:cTn>
+                                        <p:tgtEl>
+                                          <p:spTgt spid="13"/>
+                                        </p:tgtEl>
+                                        <p:attrNameLst>
+                                          <p:attrName>style.visibility</p:attrName>
+                                        </p:attrNameLst>
+                                      </p:cBhvr>
+                                      <p:to>
+                                        <p:strVal val="visible"/>
+                                      </p:to>
+                                    </p:set>
+                                    <p:animEffect transition="in" filter="fade">
+                                      <p:cBhvr>
+                                        <p:cTn id="18" dur="500"/>
+                                        <p:tgtEl>
+                                          <p:spTgt spid="13"/>
+                                        </p:tgtEl>
+                                      </p:cBhvr>
+                                    </p:animEffect>
+                                  </p:childTnLst>
+                                </p:cTn>
+                              </p:par>
+                            </p:childTnLst>
+                          </p:cTn>
+                        </p:par>
+                      </p:childTnLst>
+                    </p:cTn>
+                  </p:par>
+                  <p:par>
+                    <p:cTn id="19" fill="hold">
+                      <p:stCondLst>
+                        <p:cond delay="indefinite"/>
+                      </p:stCondLst>
+                      <p:childTnLst>
+                        <p:par>
+                          <p:cTn id="20" fill="hold">
+                            <p:stCondLst>
+                              <p:cond delay="0"/>
+                            </p:stCondLst>
+                            <p:childTnLst>
+                              <p:par>
+                                <p:cTn id="21" presetID="10" presetClass="exit" presetSubtype="0" fill="hold" nodeType="clickEffect">
+                                  <p:stCondLst>
+                                    <p:cond delay="0"/>
+                                  </p:stCondLst>
+                                  <p:childTnLst>
+                                    <p:animEffect transition="out" filter="fade">
+                                      <p:cBhvr>
+                                        <p:cTn id="22" dur="500"/>
+                                        <p:tgtEl>
+                                          <p:spTgt spid="13"/>
+                                        </p:tgtEl>
+                                      </p:cBhvr>
+                                    </p:animEffect>
+                                    <p:set>
+                                      <p:cBhvr>
+                                        <p:cTn id="23" dur="1" fill="hold">
+                                          <p:stCondLst>
+                                            <p:cond delay="499"/>
+                                          </p:stCondLst>
+                                        </p:cTn>
+                                        <p:tgtEl>
+                                          <p:spTgt spid="13"/>
+                                        </p:tgtEl>
+                                        <p:attrNameLst>
+                                          <p:attrName>style.visibility</p:attrName>
+                                        </p:attrNameLst>
+                                      </p:cBhvr>
+                                      <p:to>
+                                        <p:strVal val="hidden"/>
+                                      </p:to>
+                                    </p:set>
+                                  </p:childTnLst>
+                                </p:cTn>
+                              </p:par>
+                              <p:par>
+                                <p:cTn id="24" presetID="10" presetClass="entr" presetSubtype="0" fill="hold" nodeType="withEffect">
+                                  <p:stCondLst>
+                                    <p:cond delay="0"/>
+                                  </p:stCondLst>
+                                  <p:childTnLst>
+                                    <p:set>
+                                      <p:cBhvr>
+                                        <p:cTn id="25" dur="1" fill="hold">
+                                          <p:stCondLst>
+                                            <p:cond delay="0"/>
+                                          </p:stCondLst>
+                                        </p:cTn>
+                                        <p:tgtEl>
+                                          <p:spTgt spid="2"/>
+                                        </p:tgtEl>
+                                        <p:attrNameLst>
+                                          <p:attrName>style.visibility</p:attrName>
+                                        </p:attrNameLst>
+                                      </p:cBhvr>
+                                      <p:to>
+                                        <p:strVal val="visible"/>
+                                      </p:to>
+                                    </p:set>
+                                    <p:animEffect transition="in" filter="fade">
+                                      <p:cBhvr>
+                                        <p:cTn id="26" dur="500"/>
+                                        <p:tgtEl>
+                                          <p:spTgt spid="2"/>
+                                        </p:tgtEl>
+                                      </p:cBhvr>
+                                    </p:animEffect>
+                                  </p:childTnLst>
+                                </p:cTn>
+                              </p:par>
+                            </p:childTnLst>
+                          </p:cTn>
+                        </p:par>
+                      </p:childTnLst>
+                    </p:cTn>
+                  </p:par>
+                </p:childTnLst>
+              </p:cTn>
+              <p:prevCondLst>
+                <p:cond evt="onPrev" delay="0">
+                  <p:tgtEl>
+                    <p:sldTgt/>
+                  </p:tgtEl>
+                </p:cond>
+              </p:prevCondLst>
+              <p:nextCondLst>
+                <p:cond evt="onNext" delay="0">
+                  <p:tgtEl>
+                    <p:sldTgt/>
+                  </p:tgtEl>
+                </p:cond>
+              </p:nextCondLst>
+            </p:seq>
+          </p:childTnLst>
+        </p:cTn>
+      </p:par>
+    </p:tnLst>
+  </p:timing>
 </p:sld>
 </file>
 

</xml_diff>

<commit_message>
Feature/report: update the latest version of report and slides (#48)
</commit_message>
<xml_diff>
--- a/presentation/Final Project OOP Slides.pptx
+++ b/presentation/Final Project OOP Slides.pptx
@@ -17,9 +17,9 @@
     <p:sldId id="316" r:id="rId8"/>
     <p:sldId id="317" r:id="rId9"/>
     <p:sldId id="318" r:id="rId10"/>
-    <p:sldId id="319" r:id="rId11"/>
-    <p:sldId id="320" r:id="rId12"/>
-    <p:sldId id="321" r:id="rId13"/>
+    <p:sldId id="321" r:id="rId11"/>
+    <p:sldId id="319" r:id="rId12"/>
+    <p:sldId id="320" r:id="rId13"/>
     <p:sldId id="272" r:id="rId14"/>
     <p:sldId id="284" r:id="rId15"/>
   </p:sldIdLst>
@@ -931,7 +931,7 @@
     </p:spTree>
     <p:extLst>
       <p:ext uri="{BB962C8B-B14F-4D97-AF65-F5344CB8AC3E}">
-        <p14:creationId xmlns:p14="http://schemas.microsoft.com/office/powerpoint/2010/main" val="2579508847"/>
+        <p14:creationId xmlns:p14="http://schemas.microsoft.com/office/powerpoint/2010/main" val="405162759"/>
       </p:ext>
     </p:extLst>
   </p:cSld>
@@ -1040,7 +1040,7 @@
     </p:spTree>
     <p:extLst>
       <p:ext uri="{BB962C8B-B14F-4D97-AF65-F5344CB8AC3E}">
-        <p14:creationId xmlns:p14="http://schemas.microsoft.com/office/powerpoint/2010/main" val="87499959"/>
+        <p14:creationId xmlns:p14="http://schemas.microsoft.com/office/powerpoint/2010/main" val="2579508847"/>
       </p:ext>
     </p:extLst>
   </p:cSld>
@@ -1149,7 +1149,7 @@
     </p:spTree>
     <p:extLst>
       <p:ext uri="{BB962C8B-B14F-4D97-AF65-F5344CB8AC3E}">
-        <p14:creationId xmlns:p14="http://schemas.microsoft.com/office/powerpoint/2010/main" val="1731694012"/>
+        <p14:creationId xmlns:p14="http://schemas.microsoft.com/office/powerpoint/2010/main" val="87499959"/>
       </p:ext>
     </p:extLst>
   </p:cSld>
@@ -2108,6 +2108,10 @@
               </a:spcAft>
               <a:buNone/>
             </a:pPr>
+            <a:r>
+              <a:rPr lang="en-US"/>
+              <a:t>sadasdasdasdsa</a:t>
+            </a:r>
             <a:endParaRPr/>
           </a:p>
         </p:txBody>
@@ -3598,7 +3602,7 @@
         </p:nvSpPr>
         <p:spPr>
           <a:xfrm flipH="1">
-            <a:off x="7024500" y="2600625"/>
+            <a:off x="7078289" y="2653518"/>
             <a:ext cx="3405900" cy="3302400"/>
           </a:xfrm>
           <a:prstGeom prst="rtTriangle">
@@ -3646,7 +3650,7 @@
         </p:nvSpPr>
         <p:spPr>
           <a:xfrm flipH="1">
-            <a:off x="7128800" y="2600625"/>
+            <a:off x="7182589" y="2653518"/>
             <a:ext cx="3405900" cy="3302400"/>
           </a:xfrm>
           <a:prstGeom prst="rtTriangle">
@@ -3690,7 +3694,7 @@
         </p:nvSpPr>
         <p:spPr>
           <a:xfrm rot="10800000" flipH="1">
-            <a:off x="-762425" y="-915550"/>
+            <a:off x="-810900" y="-1063468"/>
             <a:ext cx="3405900" cy="3302400"/>
           </a:xfrm>
           <a:prstGeom prst="rtTriangle">
@@ -7534,6 +7538,403 @@
         </p:nvSpPr>
         <p:spPr>
           <a:xfrm>
+            <a:off x="1705088" y="657"/>
+            <a:ext cx="5762400" cy="699900"/>
+          </a:xfrm>
+          <a:prstGeom prst="rect">
+            <a:avLst/>
+          </a:prstGeom>
+          <a:noFill/>
+          <a:ln>
+            <a:noFill/>
+          </a:ln>
+        </p:spPr>
+        <p:txBody>
+          <a:bodyPr spcFirstLastPara="1" wrap="square" lIns="91425" tIns="91425" rIns="91425" bIns="91425" anchor="ctr" anchorCtr="0">
+            <a:noAutofit/>
+          </a:bodyPr>
+          <a:lstStyle>
+            <a:defPPr marR="0" lvl="0" algn="l" rtl="0">
+              <a:lnSpc>
+                <a:spcPct val="100000"/>
+              </a:lnSpc>
+              <a:spcBef>
+                <a:spcPts val="0"/>
+              </a:spcBef>
+              <a:spcAft>
+                <a:spcPts val="0"/>
+              </a:spcAft>
+            </a:defPPr>
+            <a:lvl1pPr marR="0" lvl="0" algn="ctr" rtl="0">
+              <a:lnSpc>
+                <a:spcPct val="100000"/>
+              </a:lnSpc>
+              <a:spcBef>
+                <a:spcPts val="0"/>
+              </a:spcBef>
+              <a:spcAft>
+                <a:spcPts val="0"/>
+              </a:spcAft>
+              <a:buClr>
+                <a:schemeClr val="dk1"/>
+              </a:buClr>
+              <a:buSzPts val="2700"/>
+              <a:buFont typeface="Julius Sans One"/>
+              <a:buNone/>
+              <a:defRPr sz="3000" b="1" i="0" u="none" strike="noStrike" cap="none">
+                <a:solidFill>
+                  <a:schemeClr val="dk1"/>
+                </a:solidFill>
+                <a:latin typeface="Julius Sans One"/>
+                <a:ea typeface="Julius Sans One"/>
+                <a:cs typeface="Julius Sans One"/>
+                <a:sym typeface="Julius Sans One"/>
+              </a:defRPr>
+            </a:lvl1pPr>
+            <a:lvl2pPr marR="0" lvl="1" algn="ctr" rtl="0">
+              <a:lnSpc>
+                <a:spcPct val="100000"/>
+              </a:lnSpc>
+              <a:spcBef>
+                <a:spcPts val="0"/>
+              </a:spcBef>
+              <a:spcAft>
+                <a:spcPts val="0"/>
+              </a:spcAft>
+              <a:buClr>
+                <a:schemeClr val="dk1"/>
+              </a:buClr>
+              <a:buSzPts val="3000"/>
+              <a:buFont typeface="Julius Sans One"/>
+              <a:buNone/>
+              <a:defRPr sz="3000" b="1" i="0" u="none" strike="noStrike" cap="none">
+                <a:solidFill>
+                  <a:schemeClr val="dk1"/>
+                </a:solidFill>
+                <a:latin typeface="Julius Sans One"/>
+                <a:ea typeface="Julius Sans One"/>
+                <a:cs typeface="Julius Sans One"/>
+                <a:sym typeface="Julius Sans One"/>
+              </a:defRPr>
+            </a:lvl2pPr>
+            <a:lvl3pPr marR="0" lvl="2" algn="ctr" rtl="0">
+              <a:lnSpc>
+                <a:spcPct val="100000"/>
+              </a:lnSpc>
+              <a:spcBef>
+                <a:spcPts val="0"/>
+              </a:spcBef>
+              <a:spcAft>
+                <a:spcPts val="0"/>
+              </a:spcAft>
+              <a:buClr>
+                <a:schemeClr val="dk1"/>
+              </a:buClr>
+              <a:buSzPts val="3000"/>
+              <a:buFont typeface="Julius Sans One"/>
+              <a:buNone/>
+              <a:defRPr sz="3000" b="1" i="0" u="none" strike="noStrike" cap="none">
+                <a:solidFill>
+                  <a:schemeClr val="dk1"/>
+                </a:solidFill>
+                <a:latin typeface="Julius Sans One"/>
+                <a:ea typeface="Julius Sans One"/>
+                <a:cs typeface="Julius Sans One"/>
+                <a:sym typeface="Julius Sans One"/>
+              </a:defRPr>
+            </a:lvl3pPr>
+            <a:lvl4pPr marR="0" lvl="3" algn="ctr" rtl="0">
+              <a:lnSpc>
+                <a:spcPct val="100000"/>
+              </a:lnSpc>
+              <a:spcBef>
+                <a:spcPts val="0"/>
+              </a:spcBef>
+              <a:spcAft>
+                <a:spcPts val="0"/>
+              </a:spcAft>
+              <a:buClr>
+                <a:schemeClr val="dk1"/>
+              </a:buClr>
+              <a:buSzPts val="3000"/>
+              <a:buFont typeface="Julius Sans One"/>
+              <a:buNone/>
+              <a:defRPr sz="3000" b="1" i="0" u="none" strike="noStrike" cap="none">
+                <a:solidFill>
+                  <a:schemeClr val="dk1"/>
+                </a:solidFill>
+                <a:latin typeface="Julius Sans One"/>
+                <a:ea typeface="Julius Sans One"/>
+                <a:cs typeface="Julius Sans One"/>
+                <a:sym typeface="Julius Sans One"/>
+              </a:defRPr>
+            </a:lvl4pPr>
+            <a:lvl5pPr marR="0" lvl="4" algn="ctr" rtl="0">
+              <a:lnSpc>
+                <a:spcPct val="100000"/>
+              </a:lnSpc>
+              <a:spcBef>
+                <a:spcPts val="0"/>
+              </a:spcBef>
+              <a:spcAft>
+                <a:spcPts val="0"/>
+              </a:spcAft>
+              <a:buClr>
+                <a:schemeClr val="dk1"/>
+              </a:buClr>
+              <a:buSzPts val="3000"/>
+              <a:buFont typeface="Julius Sans One"/>
+              <a:buNone/>
+              <a:defRPr sz="3000" b="1" i="0" u="none" strike="noStrike" cap="none">
+                <a:solidFill>
+                  <a:schemeClr val="dk1"/>
+                </a:solidFill>
+                <a:latin typeface="Julius Sans One"/>
+                <a:ea typeface="Julius Sans One"/>
+                <a:cs typeface="Julius Sans One"/>
+                <a:sym typeface="Julius Sans One"/>
+              </a:defRPr>
+            </a:lvl5pPr>
+            <a:lvl6pPr marR="0" lvl="5" algn="ctr" rtl="0">
+              <a:lnSpc>
+                <a:spcPct val="100000"/>
+              </a:lnSpc>
+              <a:spcBef>
+                <a:spcPts val="0"/>
+              </a:spcBef>
+              <a:spcAft>
+                <a:spcPts val="0"/>
+              </a:spcAft>
+              <a:buClr>
+                <a:schemeClr val="dk1"/>
+              </a:buClr>
+              <a:buSzPts val="3000"/>
+              <a:buFont typeface="Julius Sans One"/>
+              <a:buNone/>
+              <a:defRPr sz="3000" b="1" i="0" u="none" strike="noStrike" cap="none">
+                <a:solidFill>
+                  <a:schemeClr val="dk1"/>
+                </a:solidFill>
+                <a:latin typeface="Julius Sans One"/>
+                <a:ea typeface="Julius Sans One"/>
+                <a:cs typeface="Julius Sans One"/>
+                <a:sym typeface="Julius Sans One"/>
+              </a:defRPr>
+            </a:lvl6pPr>
+            <a:lvl7pPr marR="0" lvl="6" algn="ctr" rtl="0">
+              <a:lnSpc>
+                <a:spcPct val="100000"/>
+              </a:lnSpc>
+              <a:spcBef>
+                <a:spcPts val="0"/>
+              </a:spcBef>
+              <a:spcAft>
+                <a:spcPts val="0"/>
+              </a:spcAft>
+              <a:buClr>
+                <a:schemeClr val="dk1"/>
+              </a:buClr>
+              <a:buSzPts val="3000"/>
+              <a:buFont typeface="Julius Sans One"/>
+              <a:buNone/>
+              <a:defRPr sz="3000" b="1" i="0" u="none" strike="noStrike" cap="none">
+                <a:solidFill>
+                  <a:schemeClr val="dk1"/>
+                </a:solidFill>
+                <a:latin typeface="Julius Sans One"/>
+                <a:ea typeface="Julius Sans One"/>
+                <a:cs typeface="Julius Sans One"/>
+                <a:sym typeface="Julius Sans One"/>
+              </a:defRPr>
+            </a:lvl7pPr>
+            <a:lvl8pPr marR="0" lvl="7" algn="ctr" rtl="0">
+              <a:lnSpc>
+                <a:spcPct val="100000"/>
+              </a:lnSpc>
+              <a:spcBef>
+                <a:spcPts val="0"/>
+              </a:spcBef>
+              <a:spcAft>
+                <a:spcPts val="0"/>
+              </a:spcAft>
+              <a:buClr>
+                <a:schemeClr val="dk1"/>
+              </a:buClr>
+              <a:buSzPts val="3000"/>
+              <a:buFont typeface="Julius Sans One"/>
+              <a:buNone/>
+              <a:defRPr sz="3000" b="1" i="0" u="none" strike="noStrike" cap="none">
+                <a:solidFill>
+                  <a:schemeClr val="dk1"/>
+                </a:solidFill>
+                <a:latin typeface="Julius Sans One"/>
+                <a:ea typeface="Julius Sans One"/>
+                <a:cs typeface="Julius Sans One"/>
+                <a:sym typeface="Julius Sans One"/>
+              </a:defRPr>
+            </a:lvl8pPr>
+            <a:lvl9pPr marR="0" lvl="8" algn="ctr" rtl="0">
+              <a:lnSpc>
+                <a:spcPct val="100000"/>
+              </a:lnSpc>
+              <a:spcBef>
+                <a:spcPts val="0"/>
+              </a:spcBef>
+              <a:spcAft>
+                <a:spcPts val="0"/>
+              </a:spcAft>
+              <a:buClr>
+                <a:schemeClr val="dk1"/>
+              </a:buClr>
+              <a:buSzPts val="3000"/>
+              <a:buFont typeface="Julius Sans One"/>
+              <a:buNone/>
+              <a:defRPr sz="3000" b="1" i="0" u="none" strike="noStrike" cap="none">
+                <a:solidFill>
+                  <a:schemeClr val="dk1"/>
+                </a:solidFill>
+                <a:latin typeface="Julius Sans One"/>
+                <a:ea typeface="Julius Sans One"/>
+                <a:cs typeface="Julius Sans One"/>
+                <a:sym typeface="Julius Sans One"/>
+              </a:defRPr>
+            </a:lvl9pPr>
+          </a:lstStyle>
+          <a:p>
+            <a:r>
+              <a:rPr lang="en-US"/>
+              <a:t>class diagram for util</a:t>
+            </a:r>
+          </a:p>
+        </p:txBody>
+      </p:sp>
+      <p:cxnSp>
+        <p:nvCxnSpPr>
+          <p:cNvPr id="10" name="Google Shape;304;p43">
+            <a:extLst>
+              <a:ext uri="{FF2B5EF4-FFF2-40B4-BE49-F238E27FC236}">
+                <a16:creationId xmlns:a16="http://schemas.microsoft.com/office/drawing/2014/main" id="{A8BE6309-0937-469C-88DE-C7A24E1A2B99}"/>
+              </a:ext>
+            </a:extLst>
+          </p:cNvPr>
+          <p:cNvCxnSpPr>
+            <a:cxnSpLocks/>
+          </p:cNvCxnSpPr>
+          <p:nvPr/>
+        </p:nvCxnSpPr>
+        <p:spPr>
+          <a:xfrm>
+            <a:off x="1993107" y="700557"/>
+            <a:ext cx="5236369" cy="0"/>
+          </a:xfrm>
+          <a:prstGeom prst="straightConnector1">
+            <a:avLst/>
+          </a:prstGeom>
+          <a:noFill/>
+          <a:ln w="19050" cap="flat" cmpd="sng">
+            <a:solidFill>
+              <a:schemeClr val="lt1"/>
+            </a:solidFill>
+            <a:prstDash val="solid"/>
+            <a:round/>
+            <a:headEnd type="none" w="med" len="med"/>
+            <a:tailEnd type="none" w="med" len="med"/>
+          </a:ln>
+        </p:spPr>
+      </p:cxnSp>
+      <p:pic>
+        <p:nvPicPr>
+          <p:cNvPr id="11" name="Picture 10">
+            <a:extLst>
+              <a:ext uri="{FF2B5EF4-FFF2-40B4-BE49-F238E27FC236}">
+                <a16:creationId xmlns:a16="http://schemas.microsoft.com/office/drawing/2014/main" id="{7C03E1B4-1044-43F3-9433-EF2E7EEAB129}"/>
+              </a:ext>
+            </a:extLst>
+          </p:cNvPr>
+          <p:cNvPicPr/>
+          <p:nvPr/>
+        </p:nvPicPr>
+        <p:blipFill>
+          <a:blip r:embed="rId3">
+            <a:extLst>
+              <a:ext uri="{28A0092B-C50C-407E-A947-70E740481C1C}">
+                <a14:useLocalDpi xmlns:a14="http://schemas.microsoft.com/office/drawing/2010/main" val="0"/>
+              </a:ext>
+            </a:extLst>
+          </a:blip>
+          <a:srcRect/>
+          <a:stretch>
+            <a:fillRect/>
+          </a:stretch>
+        </p:blipFill>
+        <p:spPr bwMode="auto">
+          <a:xfrm>
+            <a:off x="1849085" y="741941"/>
+            <a:ext cx="5445829" cy="4098815"/>
+          </a:xfrm>
+          <a:prstGeom prst="rect">
+            <a:avLst/>
+          </a:prstGeom>
+          <a:noFill/>
+          <a:ln>
+            <a:noFill/>
+          </a:ln>
+        </p:spPr>
+      </p:pic>
+    </p:spTree>
+    <p:extLst>
+      <p:ext uri="{BB962C8B-B14F-4D97-AF65-F5344CB8AC3E}">
+        <p14:creationId xmlns:p14="http://schemas.microsoft.com/office/powerpoint/2010/main" val="3482504378"/>
+      </p:ext>
+    </p:extLst>
+  </p:cSld>
+  <p:clrMapOvr>
+    <a:masterClrMapping/>
+  </p:clrMapOvr>
+</p:sld>
+</file>
+
+<file path=ppt/slides/slide11.xml><?xml version="1.0" encoding="utf-8"?>
+<p:sld xmlns:a="http://schemas.openxmlformats.org/drawingml/2006/main" xmlns:r="http://schemas.openxmlformats.org/officeDocument/2006/relationships" xmlns:p="http://schemas.openxmlformats.org/presentationml/2006/main">
+  <p:cSld>
+    <p:bg>
+      <p:bgPr>
+        <a:solidFill>
+          <a:schemeClr val="accent6"/>
+        </a:solidFill>
+        <a:effectLst/>
+      </p:bgPr>
+    </p:bg>
+    <p:spTree>
+      <p:nvGrpSpPr>
+        <p:cNvPr id="1" name="Shape 390"/>
+        <p:cNvGrpSpPr/>
+        <p:nvPr/>
+      </p:nvGrpSpPr>
+      <p:grpSpPr>
+        <a:xfrm>
+          <a:off x="0" y="0"/>
+          <a:ext cx="0" cy="0"/>
+          <a:chOff x="0" y="0"/>
+          <a:chExt cx="0" cy="0"/>
+        </a:xfrm>
+      </p:grpSpPr>
+      <p:sp>
+        <p:nvSpPr>
+          <p:cNvPr id="9" name="Google Shape;302;p43">
+            <a:extLst>
+              <a:ext uri="{FF2B5EF4-FFF2-40B4-BE49-F238E27FC236}">
+                <a16:creationId xmlns:a16="http://schemas.microsoft.com/office/drawing/2014/main" id="{1F4DA788-0E47-4846-B8D1-4CDB8F216CD0}"/>
+              </a:ext>
+            </a:extLst>
+          </p:cNvPr>
+          <p:cNvSpPr txBox="1">
+            <a:spLocks/>
+          </p:cNvSpPr>
+          <p:nvPr/>
+        </p:nvSpPr>
+        <p:spPr>
+          <a:xfrm>
             <a:off x="1705088" y="-6487"/>
             <a:ext cx="5762400" cy="699900"/>
           </a:xfrm>
@@ -7890,7 +8291,7 @@
 </p:sld>
 </file>
 
-<file path=ppt/slides/slide11.xml><?xml version="1.0" encoding="utf-8"?>
+<file path=ppt/slides/slide12.xml><?xml version="1.0" encoding="utf-8"?>
 <p:sld xmlns:a="http://schemas.openxmlformats.org/drawingml/2006/main" xmlns:r="http://schemas.openxmlformats.org/officeDocument/2006/relationships" xmlns:p="http://schemas.openxmlformats.org/presentationml/2006/main">
   <p:cSld>
     <p:bg>
@@ -8249,8 +8650,8 @@
         </p:nvSpPr>
         <p:spPr>
           <a:xfrm>
-            <a:off x="600075" y="842430"/>
-            <a:ext cx="8022431" cy="3715120"/>
+            <a:off x="560784" y="693413"/>
+            <a:ext cx="8022431" cy="4692823"/>
           </a:xfrm>
           <a:prstGeom prst="rect">
             <a:avLst/>
@@ -8262,30 +8663,6 @@
             <a:spAutoFit/>
           </a:bodyPr>
           <a:lstStyle/>
-          <a:p>
-            <a:pPr marL="342900" marR="0" indent="-285750" algn="just">
-              <a:lnSpc>
-                <a:spcPct val="115000"/>
-              </a:lnSpc>
-              <a:spcBef>
-                <a:spcPts val="0"/>
-              </a:spcBef>
-              <a:spcAft>
-                <a:spcPts val="1000"/>
-              </a:spcAft>
-              <a:buFont typeface="Arial" panose="020B0604020202020204" pitchFamily="34" charset="0"/>
-              <a:buChar char="•"/>
-            </a:pPr>
-            <a:r>
-              <a:rPr lang="en-US" sz="2400">
-                <a:effectLst/>
-                <a:latin typeface="Didact Gothic" panose="020B0604020202020204" charset="0"/>
-                <a:ea typeface="Arial" panose="020B0604020202020204" pitchFamily="34" charset="0"/>
-                <a:cs typeface="Times New Roman" panose="02020603050405020304" pitchFamily="18" charset="0"/>
-              </a:rPr>
-              <a:t>A column possibly contains implicants, the intermediate table contains one or more columns. </a:t>
-            </a:r>
-          </a:p>
           <a:p>
             <a:pPr marL="342900" marR="0" indent="-285750" algn="just">
               <a:lnSpc>
@@ -8315,7 +8692,28 @@
                 <a:ea typeface="Arial" panose="020B0604020202020204" pitchFamily="34" charset="0"/>
                 <a:cs typeface="Times New Roman" panose="02020603050405020304" pitchFamily="18" charset="0"/>
               </a:rPr>
-              <a:t>he aggregation relationship is used among Implicant class, the Column class, the PITable and the IntermediateTable class</a:t>
+              <a:t>he </a:t>
+            </a:r>
+            <a:r>
+              <a:rPr lang="en-US" sz="2400" b="1">
+                <a:solidFill>
+                  <a:srgbClr val="CC6666"/>
+                </a:solidFill>
+                <a:effectLst/>
+                <a:latin typeface="Didact Gothic" panose="020B0604020202020204" charset="0"/>
+                <a:ea typeface="Arial" panose="020B0604020202020204" pitchFamily="34" charset="0"/>
+                <a:cs typeface="Times New Roman" panose="02020603050405020304" pitchFamily="18" charset="0"/>
+              </a:rPr>
+              <a:t>aggregation relationship </a:t>
+            </a:r>
+            <a:r>
+              <a:rPr lang="en-US" sz="2400">
+                <a:effectLst/>
+                <a:latin typeface="Didact Gothic" panose="020B0604020202020204" charset="0"/>
+                <a:ea typeface="Arial" panose="020B0604020202020204" pitchFamily="34" charset="0"/>
+                <a:cs typeface="Times New Roman" panose="02020603050405020304" pitchFamily="18" charset="0"/>
+              </a:rPr>
+              <a:t>is used among Implicant class, the Column class, the PITable and the IntermediateTable class</a:t>
             </a:r>
           </a:p>
           <a:p>
@@ -8339,432 +8737,20 @@
                 <a:ea typeface="Arial" panose="020B0604020202020204" pitchFamily="34" charset="0"/>
                 <a:cs typeface="Times New Roman" panose="02020603050405020304" pitchFamily="18" charset="0"/>
               </a:rPr>
-              <a:t>However, the IntermediateTable must contain at least one column, so the relationship between those two is a strong composite relationship</a:t>
+              <a:t>However, the IntermediateTable must contain at least one column, so the relationship between those two is a </a:t>
             </a:r>
-          </a:p>
-        </p:txBody>
-      </p:sp>
-    </p:spTree>
-    <p:extLst>
-      <p:ext uri="{BB962C8B-B14F-4D97-AF65-F5344CB8AC3E}">
-        <p14:creationId xmlns:p14="http://schemas.microsoft.com/office/powerpoint/2010/main" val="1019771292"/>
-      </p:ext>
-    </p:extLst>
-  </p:cSld>
-  <p:clrMapOvr>
-    <a:masterClrMapping/>
-  </p:clrMapOvr>
-</p:sld>
-</file>
-
-<file path=ppt/slides/slide12.xml><?xml version="1.0" encoding="utf-8"?>
-<p:sld xmlns:a="http://schemas.openxmlformats.org/drawingml/2006/main" xmlns:r="http://schemas.openxmlformats.org/officeDocument/2006/relationships" xmlns:p="http://schemas.openxmlformats.org/presentationml/2006/main">
-  <p:cSld>
-    <p:bg>
-      <p:bgPr>
-        <a:solidFill>
-          <a:schemeClr val="accent6"/>
-        </a:solidFill>
-        <a:effectLst/>
-      </p:bgPr>
-    </p:bg>
-    <p:spTree>
-      <p:nvGrpSpPr>
-        <p:cNvPr id="1" name="Shape 390"/>
-        <p:cNvGrpSpPr/>
-        <p:nvPr/>
-      </p:nvGrpSpPr>
-      <p:grpSpPr>
-        <a:xfrm>
-          <a:off x="0" y="0"/>
-          <a:ext cx="0" cy="0"/>
-          <a:chOff x="0" y="0"/>
-          <a:chExt cx="0" cy="0"/>
-        </a:xfrm>
-      </p:grpSpPr>
-      <p:sp>
-        <p:nvSpPr>
-          <p:cNvPr id="9" name="Google Shape;302;p43">
-            <a:extLst>
-              <a:ext uri="{FF2B5EF4-FFF2-40B4-BE49-F238E27FC236}">
-                <a16:creationId xmlns:a16="http://schemas.microsoft.com/office/drawing/2014/main" id="{1F4DA788-0E47-4846-B8D1-4CDB8F216CD0}"/>
-              </a:ext>
-            </a:extLst>
-          </p:cNvPr>
-          <p:cNvSpPr txBox="1">
-            <a:spLocks/>
-          </p:cNvSpPr>
-          <p:nvPr/>
-        </p:nvSpPr>
-        <p:spPr>
-          <a:xfrm>
-            <a:off x="1705088" y="-6487"/>
-            <a:ext cx="5762400" cy="699900"/>
-          </a:xfrm>
-          <a:prstGeom prst="rect">
-            <a:avLst/>
-          </a:prstGeom>
-          <a:noFill/>
-          <a:ln>
-            <a:noFill/>
-          </a:ln>
-        </p:spPr>
-        <p:txBody>
-          <a:bodyPr spcFirstLastPara="1" wrap="square" lIns="91425" tIns="91425" rIns="91425" bIns="91425" anchor="ctr" anchorCtr="0">
-            <a:noAutofit/>
-          </a:bodyPr>
-          <a:lstStyle>
-            <a:defPPr marR="0" lvl="0" algn="l" rtl="0">
-              <a:lnSpc>
-                <a:spcPct val="100000"/>
-              </a:lnSpc>
-              <a:spcBef>
-                <a:spcPts val="0"/>
-              </a:spcBef>
-              <a:spcAft>
-                <a:spcPts val="0"/>
-              </a:spcAft>
-            </a:defPPr>
-            <a:lvl1pPr marR="0" lvl="0" algn="ctr" rtl="0">
-              <a:lnSpc>
-                <a:spcPct val="100000"/>
-              </a:lnSpc>
-              <a:spcBef>
-                <a:spcPts val="0"/>
-              </a:spcBef>
-              <a:spcAft>
-                <a:spcPts val="0"/>
-              </a:spcAft>
-              <a:buClr>
-                <a:schemeClr val="dk1"/>
-              </a:buClr>
-              <a:buSzPts val="2700"/>
-              <a:buFont typeface="Julius Sans One"/>
-              <a:buNone/>
-              <a:defRPr sz="3000" b="1" i="0" u="none" strike="noStrike" cap="none">
-                <a:solidFill>
-                  <a:schemeClr val="dk1"/>
-                </a:solidFill>
-                <a:latin typeface="Julius Sans One"/>
-                <a:ea typeface="Julius Sans One"/>
-                <a:cs typeface="Julius Sans One"/>
-                <a:sym typeface="Julius Sans One"/>
-              </a:defRPr>
-            </a:lvl1pPr>
-            <a:lvl2pPr marR="0" lvl="1" algn="ctr" rtl="0">
-              <a:lnSpc>
-                <a:spcPct val="100000"/>
-              </a:lnSpc>
-              <a:spcBef>
-                <a:spcPts val="0"/>
-              </a:spcBef>
-              <a:spcAft>
-                <a:spcPts val="0"/>
-              </a:spcAft>
-              <a:buClr>
-                <a:schemeClr val="dk1"/>
-              </a:buClr>
-              <a:buSzPts val="3000"/>
-              <a:buFont typeface="Julius Sans One"/>
-              <a:buNone/>
-              <a:defRPr sz="3000" b="1" i="0" u="none" strike="noStrike" cap="none">
-                <a:solidFill>
-                  <a:schemeClr val="dk1"/>
-                </a:solidFill>
-                <a:latin typeface="Julius Sans One"/>
-                <a:ea typeface="Julius Sans One"/>
-                <a:cs typeface="Julius Sans One"/>
-                <a:sym typeface="Julius Sans One"/>
-              </a:defRPr>
-            </a:lvl2pPr>
-            <a:lvl3pPr marR="0" lvl="2" algn="ctr" rtl="0">
-              <a:lnSpc>
-                <a:spcPct val="100000"/>
-              </a:lnSpc>
-              <a:spcBef>
-                <a:spcPts val="0"/>
-              </a:spcBef>
-              <a:spcAft>
-                <a:spcPts val="0"/>
-              </a:spcAft>
-              <a:buClr>
-                <a:schemeClr val="dk1"/>
-              </a:buClr>
-              <a:buSzPts val="3000"/>
-              <a:buFont typeface="Julius Sans One"/>
-              <a:buNone/>
-              <a:defRPr sz="3000" b="1" i="0" u="none" strike="noStrike" cap="none">
-                <a:solidFill>
-                  <a:schemeClr val="dk1"/>
-                </a:solidFill>
-                <a:latin typeface="Julius Sans One"/>
-                <a:ea typeface="Julius Sans One"/>
-                <a:cs typeface="Julius Sans One"/>
-                <a:sym typeface="Julius Sans One"/>
-              </a:defRPr>
-            </a:lvl3pPr>
-            <a:lvl4pPr marR="0" lvl="3" algn="ctr" rtl="0">
-              <a:lnSpc>
-                <a:spcPct val="100000"/>
-              </a:lnSpc>
-              <a:spcBef>
-                <a:spcPts val="0"/>
-              </a:spcBef>
-              <a:spcAft>
-                <a:spcPts val="0"/>
-              </a:spcAft>
-              <a:buClr>
-                <a:schemeClr val="dk1"/>
-              </a:buClr>
-              <a:buSzPts val="3000"/>
-              <a:buFont typeface="Julius Sans One"/>
-              <a:buNone/>
-              <a:defRPr sz="3000" b="1" i="0" u="none" strike="noStrike" cap="none">
-                <a:solidFill>
-                  <a:schemeClr val="dk1"/>
-                </a:solidFill>
-                <a:latin typeface="Julius Sans One"/>
-                <a:ea typeface="Julius Sans One"/>
-                <a:cs typeface="Julius Sans One"/>
-                <a:sym typeface="Julius Sans One"/>
-              </a:defRPr>
-            </a:lvl4pPr>
-            <a:lvl5pPr marR="0" lvl="4" algn="ctr" rtl="0">
-              <a:lnSpc>
-                <a:spcPct val="100000"/>
-              </a:lnSpc>
-              <a:spcBef>
-                <a:spcPts val="0"/>
-              </a:spcBef>
-              <a:spcAft>
-                <a:spcPts val="0"/>
-              </a:spcAft>
-              <a:buClr>
-                <a:schemeClr val="dk1"/>
-              </a:buClr>
-              <a:buSzPts val="3000"/>
-              <a:buFont typeface="Julius Sans One"/>
-              <a:buNone/>
-              <a:defRPr sz="3000" b="1" i="0" u="none" strike="noStrike" cap="none">
-                <a:solidFill>
-                  <a:schemeClr val="dk1"/>
-                </a:solidFill>
-                <a:latin typeface="Julius Sans One"/>
-                <a:ea typeface="Julius Sans One"/>
-                <a:cs typeface="Julius Sans One"/>
-                <a:sym typeface="Julius Sans One"/>
-              </a:defRPr>
-            </a:lvl5pPr>
-            <a:lvl6pPr marR="0" lvl="5" algn="ctr" rtl="0">
-              <a:lnSpc>
-                <a:spcPct val="100000"/>
-              </a:lnSpc>
-              <a:spcBef>
-                <a:spcPts val="0"/>
-              </a:spcBef>
-              <a:spcAft>
-                <a:spcPts val="0"/>
-              </a:spcAft>
-              <a:buClr>
-                <a:schemeClr val="dk1"/>
-              </a:buClr>
-              <a:buSzPts val="3000"/>
-              <a:buFont typeface="Julius Sans One"/>
-              <a:buNone/>
-              <a:defRPr sz="3000" b="1" i="0" u="none" strike="noStrike" cap="none">
-                <a:solidFill>
-                  <a:schemeClr val="dk1"/>
-                </a:solidFill>
-                <a:latin typeface="Julius Sans One"/>
-                <a:ea typeface="Julius Sans One"/>
-                <a:cs typeface="Julius Sans One"/>
-                <a:sym typeface="Julius Sans One"/>
-              </a:defRPr>
-            </a:lvl6pPr>
-            <a:lvl7pPr marR="0" lvl="6" algn="ctr" rtl="0">
-              <a:lnSpc>
-                <a:spcPct val="100000"/>
-              </a:lnSpc>
-              <a:spcBef>
-                <a:spcPts val="0"/>
-              </a:spcBef>
-              <a:spcAft>
-                <a:spcPts val="0"/>
-              </a:spcAft>
-              <a:buClr>
-                <a:schemeClr val="dk1"/>
-              </a:buClr>
-              <a:buSzPts val="3000"/>
-              <a:buFont typeface="Julius Sans One"/>
-              <a:buNone/>
-              <a:defRPr sz="3000" b="1" i="0" u="none" strike="noStrike" cap="none">
-                <a:solidFill>
-                  <a:schemeClr val="dk1"/>
-                </a:solidFill>
-                <a:latin typeface="Julius Sans One"/>
-                <a:ea typeface="Julius Sans One"/>
-                <a:cs typeface="Julius Sans One"/>
-                <a:sym typeface="Julius Sans One"/>
-              </a:defRPr>
-            </a:lvl7pPr>
-            <a:lvl8pPr marR="0" lvl="7" algn="ctr" rtl="0">
-              <a:lnSpc>
-                <a:spcPct val="100000"/>
-              </a:lnSpc>
-              <a:spcBef>
-                <a:spcPts val="0"/>
-              </a:spcBef>
-              <a:spcAft>
-                <a:spcPts val="0"/>
-              </a:spcAft>
-              <a:buClr>
-                <a:schemeClr val="dk1"/>
-              </a:buClr>
-              <a:buSzPts val="3000"/>
-              <a:buFont typeface="Julius Sans One"/>
-              <a:buNone/>
-              <a:defRPr sz="3000" b="1" i="0" u="none" strike="noStrike" cap="none">
-                <a:solidFill>
-                  <a:schemeClr val="dk1"/>
-                </a:solidFill>
-                <a:latin typeface="Julius Sans One"/>
-                <a:ea typeface="Julius Sans One"/>
-                <a:cs typeface="Julius Sans One"/>
-                <a:sym typeface="Julius Sans One"/>
-              </a:defRPr>
-            </a:lvl8pPr>
-            <a:lvl9pPr marR="0" lvl="8" algn="ctr" rtl="0">
-              <a:lnSpc>
-                <a:spcPct val="100000"/>
-              </a:lnSpc>
-              <a:spcBef>
-                <a:spcPts val="0"/>
-              </a:spcBef>
-              <a:spcAft>
-                <a:spcPts val="0"/>
-              </a:spcAft>
-              <a:buClr>
-                <a:schemeClr val="dk1"/>
-              </a:buClr>
-              <a:buSzPts val="3000"/>
-              <a:buFont typeface="Julius Sans One"/>
-              <a:buNone/>
-              <a:defRPr sz="3000" b="1" i="0" u="none" strike="noStrike" cap="none">
-                <a:solidFill>
-                  <a:schemeClr val="dk1"/>
-                </a:solidFill>
-                <a:latin typeface="Julius Sans One"/>
-                <a:ea typeface="Julius Sans One"/>
-                <a:cs typeface="Julius Sans One"/>
-                <a:sym typeface="Julius Sans One"/>
-              </a:defRPr>
-            </a:lvl9pPr>
-          </a:lstStyle>
-          <a:p>
             <a:r>
-              <a:rPr lang="en-US"/>
-              <a:t>Explanation of oop design</a:t>
-            </a:r>
-          </a:p>
-        </p:txBody>
-      </p:sp>
-      <p:cxnSp>
-        <p:nvCxnSpPr>
-          <p:cNvPr id="10" name="Google Shape;304;p43">
-            <a:extLst>
-              <a:ext uri="{FF2B5EF4-FFF2-40B4-BE49-F238E27FC236}">
-                <a16:creationId xmlns:a16="http://schemas.microsoft.com/office/drawing/2014/main" id="{A8BE6309-0937-469C-88DE-C7A24E1A2B99}"/>
-              </a:ext>
-            </a:extLst>
-          </p:cNvPr>
-          <p:cNvCxnSpPr>
-            <a:cxnSpLocks/>
-          </p:cNvCxnSpPr>
-          <p:nvPr/>
-        </p:nvCxnSpPr>
-        <p:spPr>
-          <a:xfrm>
-            <a:off x="1993107" y="693413"/>
-            <a:ext cx="5236369" cy="0"/>
-          </a:xfrm>
-          <a:prstGeom prst="straightConnector1">
-            <a:avLst/>
-          </a:prstGeom>
-          <a:noFill/>
-          <a:ln w="19050" cap="flat" cmpd="sng">
-            <a:solidFill>
-              <a:schemeClr val="lt1"/>
-            </a:solidFill>
-            <a:prstDash val="solid"/>
-            <a:round/>
-            <a:headEnd type="none" w="med" len="med"/>
-            <a:tailEnd type="none" w="med" len="med"/>
-          </a:ln>
-        </p:spPr>
-      </p:cxnSp>
-      <p:sp>
-        <p:nvSpPr>
-          <p:cNvPr id="6" name="TextBox 5">
-            <a:extLst>
-              <a:ext uri="{FF2B5EF4-FFF2-40B4-BE49-F238E27FC236}">
-                <a16:creationId xmlns:a16="http://schemas.microsoft.com/office/drawing/2014/main" id="{30950A46-D7FA-4EA5-A02F-DFF0392C1391}"/>
-              </a:ext>
-            </a:extLst>
-          </p:cNvPr>
-          <p:cNvSpPr txBox="1"/>
-          <p:nvPr/>
-        </p:nvSpPr>
-        <p:spPr>
-          <a:xfrm>
-            <a:off x="600075" y="842430"/>
-            <a:ext cx="8022431" cy="3843360"/>
-          </a:xfrm>
-          <a:prstGeom prst="rect">
-            <a:avLst/>
-          </a:prstGeom>
-          <a:noFill/>
-        </p:spPr>
-        <p:txBody>
-          <a:bodyPr wrap="square" rtlCol="0">
-            <a:spAutoFit/>
-          </a:bodyPr>
-          <a:lstStyle/>
-          <a:p>
-            <a:pPr marL="342900" indent="-285750" algn="just">
-              <a:lnSpc>
-                <a:spcPct val="115000"/>
-              </a:lnSpc>
-              <a:spcAft>
-                <a:spcPts val="1000"/>
-              </a:spcAft>
-              <a:buFont typeface="Arial" panose="020B0604020202020204" pitchFamily="34" charset="0"/>
-              <a:buChar char="•"/>
-            </a:pPr>
-            <a:r>
-              <a:rPr lang="en-US" sz="2400">
+              <a:rPr lang="en-US" sz="2400" b="1">
+                <a:solidFill>
+                  <a:srgbClr val="CC6666"/>
+                </a:solidFill>
                 <a:effectLst/>
                 <a:latin typeface="Didact Gothic" panose="020B0604020202020204" charset="0"/>
                 <a:ea typeface="Arial" panose="020B0604020202020204" pitchFamily="34" charset="0"/>
                 <a:cs typeface="Times New Roman" panose="02020603050405020304" pitchFamily="18" charset="0"/>
               </a:rPr>
-              <a:t>The Implicant class is a parent class which is inherited by the Minterm class and CombinedImplicant class. All of the other classes interact with Implicant only so the true type is determined when the program is running </a:t>
+              <a:t>strong composite relationship</a:t>
             </a:r>
-            <a:r>
-              <a:rPr lang="en-US" sz="2400">
-                <a:effectLst/>
-                <a:latin typeface="Didact Gothic" panose="020B0604020202020204" charset="0"/>
-                <a:ea typeface="Arial" panose="020B0604020202020204" pitchFamily="34" charset="0"/>
-                <a:cs typeface="Times New Roman" panose="02020603050405020304" pitchFamily="18" charset="0"/>
-                <a:sym typeface="Wingdings" panose="05000000000000000000" pitchFamily="2" charset="2"/>
-              </a:rPr>
-              <a:t> runtime polymorphism</a:t>
-            </a:r>
-            <a:endParaRPr lang="en-US" sz="2400">
-              <a:effectLst/>
-              <a:latin typeface="Didact Gothic" panose="020B0604020202020204" charset="0"/>
-              <a:ea typeface="Arial" panose="020B0604020202020204" pitchFamily="34" charset="0"/>
-              <a:cs typeface="Times New Roman" panose="02020603050405020304" pitchFamily="18" charset="0"/>
-            </a:endParaRPr>
           </a:p>
           <a:p>
             <a:pPr marL="342900" indent="-285750" algn="just">
@@ -8790,20 +8776,27 @@
                 <a:latin typeface="Didact Gothic" panose="020B0604020202020204" charset="0"/>
                 <a:ea typeface="Arial" panose="020B0604020202020204" pitchFamily="34" charset="0"/>
               </a:rPr>
-              <a:t>he IntermediateTable and PITable both inherit the Table class</a:t>
+              <a:t>he IntermediateTable and PITable both </a:t>
             </a:r>
-          </a:p>
-          <a:p>
-            <a:pPr marL="342900" indent="-285750" algn="just">
-              <a:lnSpc>
-                <a:spcPct val="115000"/>
-              </a:lnSpc>
-              <a:spcAft>
-                <a:spcPts val="1000"/>
-              </a:spcAft>
-              <a:buFont typeface="Arial" panose="020B0604020202020204" pitchFamily="34" charset="0"/>
-              <a:buChar char="•"/>
-            </a:pPr>
+            <a:r>
+              <a:rPr lang="en-US" sz="2400" b="1">
+                <a:solidFill>
+                  <a:srgbClr val="CC6666"/>
+                </a:solidFill>
+                <a:effectLst/>
+                <a:latin typeface="Didact Gothic" panose="020B0604020202020204" charset="0"/>
+                <a:ea typeface="Arial" panose="020B0604020202020204" pitchFamily="34" charset="0"/>
+              </a:rPr>
+              <a:t>inherit</a:t>
+            </a:r>
+            <a:r>
+              <a:rPr lang="en-US" sz="2400">
+                <a:effectLst/>
+                <a:latin typeface="Didact Gothic" panose="020B0604020202020204" charset="0"/>
+                <a:ea typeface="Arial" panose="020B0604020202020204" pitchFamily="34" charset="0"/>
+              </a:rPr>
+              <a:t> the Table class. </a:t>
+            </a:r>
             <a:r>
               <a:rPr lang="en-US" sz="2400">
                 <a:latin typeface="Didact Gothic" panose="020B0604020202020204" charset="0"/>
@@ -8817,9 +8810,52 @@
                 <a:latin typeface="Didact Gothic" panose="020B0604020202020204" charset="0"/>
                 <a:ea typeface="Arial" panose="020B0604020202020204" pitchFamily="34" charset="0"/>
               </a:rPr>
-              <a:t>he SOP and POS class should inherit the OuputFunction </a:t>
+              <a:t>he SOP and POS class should </a:t>
+            </a:r>
+            <a:r>
+              <a:rPr lang="en-US" sz="2400" b="1">
+                <a:solidFill>
+                  <a:srgbClr val="CC6666"/>
+                </a:solidFill>
+                <a:effectLst/>
+                <a:latin typeface="Didact Gothic" panose="020B0604020202020204" charset="0"/>
+                <a:ea typeface="Arial" panose="020B0604020202020204" pitchFamily="34" charset="0"/>
+              </a:rPr>
+              <a:t>inherit</a:t>
+            </a:r>
+            <a:r>
+              <a:rPr lang="en-US" sz="2400">
+                <a:effectLst/>
+                <a:latin typeface="Didact Gothic" panose="020B0604020202020204" charset="0"/>
+                <a:ea typeface="Arial" panose="020B0604020202020204" pitchFamily="34" charset="0"/>
+              </a:rPr>
+              <a:t> the CanonicalForm</a:t>
             </a:r>
             <a:endParaRPr lang="en-US" sz="2400">
+              <a:effectLst/>
+              <a:latin typeface="Didact Gothic" panose="020B0604020202020204" charset="0"/>
+              <a:ea typeface="Arial" panose="020B0604020202020204" pitchFamily="34" charset="0"/>
+              <a:cs typeface="Times New Roman" panose="02020603050405020304" pitchFamily="18" charset="0"/>
+            </a:endParaRPr>
+          </a:p>
+          <a:p>
+            <a:pPr marL="342900" marR="0" indent="-285750" algn="just">
+              <a:lnSpc>
+                <a:spcPct val="115000"/>
+              </a:lnSpc>
+              <a:spcBef>
+                <a:spcPts val="0"/>
+              </a:spcBef>
+              <a:spcAft>
+                <a:spcPts val="1000"/>
+              </a:spcAft>
+              <a:buFont typeface="Arial" panose="020B0604020202020204" pitchFamily="34" charset="0"/>
+              <a:buChar char="•"/>
+            </a:pPr>
+            <a:endParaRPr lang="en-US" sz="2400" b="1">
+              <a:solidFill>
+                <a:srgbClr val="CC6666"/>
+              </a:solidFill>
               <a:effectLst/>
               <a:latin typeface="Didact Gothic" panose="020B0604020202020204" charset="0"/>
               <a:ea typeface="Arial" panose="020B0604020202020204" pitchFamily="34" charset="0"/>
@@ -8831,7 +8867,7 @@
     </p:spTree>
     <p:extLst>
       <p:ext uri="{BB962C8B-B14F-4D97-AF65-F5344CB8AC3E}">
-        <p14:creationId xmlns:p14="http://schemas.microsoft.com/office/powerpoint/2010/main" val="2801201098"/>
+        <p14:creationId xmlns:p14="http://schemas.microsoft.com/office/powerpoint/2010/main" val="1019771292"/>
       </p:ext>
     </p:extLst>
   </p:cSld>
@@ -8965,7 +9001,7 @@
         </p:blipFill>
         <p:spPr>
           <a:xfrm>
-            <a:off x="1846651" y="848206"/>
+            <a:off x="1846651" y="777261"/>
             <a:ext cx="5450693" cy="4088020"/>
           </a:xfrm>
           <a:prstGeom prst="rect">
@@ -11072,53 +11108,6 @@
           <a:chExt cx="0" cy="0"/>
         </a:xfrm>
       </p:grpSpPr>
-      <p:pic>
-        <p:nvPicPr>
-          <p:cNvPr id="3074" name="Picture 2">
-            <a:extLst>
-              <a:ext uri="{FF2B5EF4-FFF2-40B4-BE49-F238E27FC236}">
-                <a16:creationId xmlns:a16="http://schemas.microsoft.com/office/drawing/2014/main" id="{B65DAA31-36A7-47C5-B035-17FFA66B2DA3}"/>
-              </a:ext>
-            </a:extLst>
-          </p:cNvPr>
-          <p:cNvPicPr>
-            <a:picLocks noChangeAspect="1" noChangeArrowheads="1"/>
-          </p:cNvPicPr>
-          <p:nvPr/>
-        </p:nvPicPr>
-        <p:blipFill>
-          <a:blip r:embed="rId3">
-            <a:extLst>
-              <a:ext uri="{28A0092B-C50C-407E-A947-70E740481C1C}">
-                <a14:useLocalDpi xmlns:a14="http://schemas.microsoft.com/office/drawing/2010/main" val="0"/>
-              </a:ext>
-            </a:extLst>
-          </a:blip>
-          <a:srcRect/>
-          <a:stretch>
-            <a:fillRect/>
-          </a:stretch>
-        </p:blipFill>
-        <p:spPr bwMode="auto">
-          <a:xfrm>
-            <a:off x="1730091" y="726594"/>
-            <a:ext cx="5762400" cy="4355726"/>
-          </a:xfrm>
-          <a:prstGeom prst="rect">
-            <a:avLst/>
-          </a:prstGeom>
-          <a:noFill/>
-          <a:extLst>
-            <a:ext uri="{909E8E84-426E-40DD-AFC4-6F175D3DCCD1}">
-              <a14:hiddenFill xmlns:a14="http://schemas.microsoft.com/office/drawing/2010/main">
-                <a:solidFill>
-                  <a:srgbClr val="FFFFFF"/>
-                </a:solidFill>
-              </a14:hiddenFill>
-            </a:ext>
-          </a:extLst>
-        </p:spPr>
-      </p:pic>
       <p:sp>
         <p:nvSpPr>
           <p:cNvPr id="5" name="Google Shape;302;p43">
@@ -11439,6 +11428,45 @@
           </a:ln>
         </p:spPr>
       </p:cxnSp>
+      <p:pic>
+        <p:nvPicPr>
+          <p:cNvPr id="8" name="Picture 7">
+            <a:extLst>
+              <a:ext uri="{FF2B5EF4-FFF2-40B4-BE49-F238E27FC236}">
+                <a16:creationId xmlns:a16="http://schemas.microsoft.com/office/drawing/2014/main" id="{4649EB83-A67A-4A6E-8912-20EBBD649174}"/>
+              </a:ext>
+            </a:extLst>
+          </p:cNvPr>
+          <p:cNvPicPr/>
+          <p:nvPr/>
+        </p:nvPicPr>
+        <p:blipFill>
+          <a:blip r:embed="rId3" cstate="print">
+            <a:extLst>
+              <a:ext uri="{28A0092B-C50C-407E-A947-70E740481C1C}">
+                <a14:useLocalDpi xmlns:a14="http://schemas.microsoft.com/office/drawing/2010/main" val="0"/>
+              </a:ext>
+            </a:extLst>
+          </a:blip>
+          <a:srcRect/>
+          <a:stretch>
+            <a:fillRect/>
+          </a:stretch>
+        </p:blipFill>
+        <p:spPr bwMode="auto">
+          <a:xfrm>
+            <a:off x="1734821" y="864395"/>
+            <a:ext cx="5732667" cy="4093366"/>
+          </a:xfrm>
+          <a:prstGeom prst="rect">
+            <a:avLst/>
+          </a:prstGeom>
+          <a:noFill/>
+          <a:ln>
+            <a:noFill/>
+          </a:ln>
+        </p:spPr>
+      </p:pic>
     </p:spTree>
     <p:extLst>
       <p:ext uri="{BB962C8B-B14F-4D97-AF65-F5344CB8AC3E}">
@@ -11556,7 +11584,7 @@
         </p:nvSpPr>
         <p:spPr>
           <a:xfrm>
-            <a:off x="1705088" y="657"/>
+            <a:off x="1690800" y="657"/>
             <a:ext cx="5762400" cy="699900"/>
           </a:xfrm>
           <a:prstGeom prst="rect">
@@ -11821,7 +11849,7 @@
           <a:p>
             <a:r>
               <a:rPr lang="en-US"/>
-              <a:t>Minterm class diagram</a:t>
+              <a:t>class diagram for minterm</a:t>
             </a:r>
           </a:p>
         </p:txBody>
@@ -11898,45 +11926,6 @@
           <a:chExt cx="0" cy="0"/>
         </a:xfrm>
       </p:grpSpPr>
-      <p:pic>
-        <p:nvPicPr>
-          <p:cNvPr id="8" name="Picture 7">
-            <a:extLst>
-              <a:ext uri="{FF2B5EF4-FFF2-40B4-BE49-F238E27FC236}">
-                <a16:creationId xmlns:a16="http://schemas.microsoft.com/office/drawing/2014/main" id="{62A6A26E-8A0A-4652-A0FF-AA34758A126B}"/>
-              </a:ext>
-            </a:extLst>
-          </p:cNvPr>
-          <p:cNvPicPr/>
-          <p:nvPr/>
-        </p:nvPicPr>
-        <p:blipFill>
-          <a:blip r:embed="rId3" cstate="print">
-            <a:extLst>
-              <a:ext uri="{28A0092B-C50C-407E-A947-70E740481C1C}">
-                <a14:useLocalDpi xmlns:a14="http://schemas.microsoft.com/office/drawing/2010/main" val="0"/>
-              </a:ext>
-            </a:extLst>
-          </a:blip>
-          <a:srcRect/>
-          <a:stretch>
-            <a:fillRect/>
-          </a:stretch>
-        </p:blipFill>
-        <p:spPr bwMode="auto">
-          <a:xfrm>
-            <a:off x="1299470" y="741370"/>
-            <a:ext cx="6545058" cy="3758724"/>
-          </a:xfrm>
-          <a:prstGeom prst="rect">
-            <a:avLst/>
-          </a:prstGeom>
-          <a:noFill/>
-          <a:ln>
-            <a:noFill/>
-          </a:ln>
-        </p:spPr>
-      </p:pic>
       <p:sp>
         <p:nvSpPr>
           <p:cNvPr id="9" name="Google Shape;302;p43">
@@ -12218,7 +12207,7 @@
           <a:p>
             <a:r>
               <a:rPr lang="en-US"/>
-              <a:t>Column class diagram</a:t>
+              <a:t>class diagram for column</a:t>
             </a:r>
           </a:p>
         </p:txBody>
@@ -12257,6 +12246,45 @@
           </a:ln>
         </p:spPr>
       </p:cxnSp>
+      <p:pic>
+        <p:nvPicPr>
+          <p:cNvPr id="5" name="Picture 4">
+            <a:extLst>
+              <a:ext uri="{FF2B5EF4-FFF2-40B4-BE49-F238E27FC236}">
+                <a16:creationId xmlns:a16="http://schemas.microsoft.com/office/drawing/2014/main" id="{8EBA4AE3-1284-4E24-A29C-268C257471DF}"/>
+              </a:ext>
+            </a:extLst>
+          </p:cNvPr>
+          <p:cNvPicPr/>
+          <p:nvPr/>
+        </p:nvPicPr>
+        <p:blipFill>
+          <a:blip r:embed="rId3" cstate="print">
+            <a:extLst>
+              <a:ext uri="{28A0092B-C50C-407E-A947-70E740481C1C}">
+                <a14:useLocalDpi xmlns:a14="http://schemas.microsoft.com/office/drawing/2010/main" val="0"/>
+              </a:ext>
+            </a:extLst>
+          </a:blip>
+          <a:srcRect/>
+          <a:stretch>
+            <a:fillRect/>
+          </a:stretch>
+        </p:blipFill>
+        <p:spPr bwMode="auto">
+          <a:xfrm>
+            <a:off x="1374616" y="827405"/>
+            <a:ext cx="6394767" cy="3937477"/>
+          </a:xfrm>
+          <a:prstGeom prst="rect">
+            <a:avLst/>
+          </a:prstGeom>
+          <a:noFill/>
+          <a:ln>
+            <a:noFill/>
+          </a:ln>
+        </p:spPr>
+      </p:pic>
     </p:spTree>
     <p:extLst>
       <p:ext uri="{BB962C8B-B14F-4D97-AF65-F5344CB8AC3E}">
@@ -12576,7 +12604,7 @@
           <a:p>
             <a:r>
               <a:rPr lang="en-US"/>
-              <a:t>table class diagram</a:t>
+              <a:t>class diagram for table </a:t>
             </a:r>
           </a:p>
         </p:txBody>
@@ -12617,10 +12645,47 @@
       </p:cxnSp>
       <p:pic>
         <p:nvPicPr>
-          <p:cNvPr id="5" name="Picture 4">
+          <p:cNvPr id="6" name="Picture 5">
             <a:extLst>
               <a:ext uri="{FF2B5EF4-FFF2-40B4-BE49-F238E27FC236}">
-                <a16:creationId xmlns:a16="http://schemas.microsoft.com/office/drawing/2014/main" id="{6984A6E7-12FD-44AD-97E6-CD85A0F7EB6A}"/>
+                <a16:creationId xmlns:a16="http://schemas.microsoft.com/office/drawing/2014/main" id="{A6102D12-5608-4CCD-ACBD-12389179EE2A}"/>
+              </a:ext>
+            </a:extLst>
+          </p:cNvPr>
+          <p:cNvPicPr/>
+          <p:nvPr/>
+        </p:nvPicPr>
+        <p:blipFill rotWithShape="1">
+          <a:blip r:embed="rId3" cstate="print">
+            <a:extLst>
+              <a:ext uri="{28A0092B-C50C-407E-A947-70E740481C1C}">
+                <a14:useLocalDpi xmlns:a14="http://schemas.microsoft.com/office/drawing/2010/main" val="0"/>
+              </a:ext>
+            </a:extLst>
+          </a:blip>
+          <a:srcRect l="13168" t="15279" r="24243" b="10775"/>
+          <a:stretch/>
+        </p:blipFill>
+        <p:spPr bwMode="auto">
+          <a:xfrm>
+            <a:off x="2896790" y="1186144"/>
+            <a:ext cx="3350419" cy="3042485"/>
+          </a:xfrm>
+          <a:prstGeom prst="rect">
+            <a:avLst/>
+          </a:prstGeom>
+          <a:noFill/>
+          <a:ln>
+            <a:noFill/>
+          </a:ln>
+        </p:spPr>
+      </p:pic>
+      <p:pic>
+        <p:nvPicPr>
+          <p:cNvPr id="7" name="Picture 6">
+            <a:extLst>
+              <a:ext uri="{FF2B5EF4-FFF2-40B4-BE49-F238E27FC236}">
+                <a16:creationId xmlns:a16="http://schemas.microsoft.com/office/drawing/2014/main" id="{AB5426D2-F9F4-4967-80E7-96473AC0FAF9}"/>
               </a:ext>
             </a:extLst>
           </p:cNvPr>
@@ -12628,7 +12693,7 @@
           <p:nvPr/>
         </p:nvPicPr>
         <p:blipFill>
-          <a:blip r:embed="rId3" cstate="print">
+          <a:blip r:embed="rId4">
             <a:extLst>
               <a:ext uri="{28A0092B-C50C-407E-A947-70E740481C1C}">
                 <a14:useLocalDpi xmlns:a14="http://schemas.microsoft.com/office/drawing/2010/main" val="0"/>
@@ -12642,16 +12707,103 @@
         </p:blipFill>
         <p:spPr bwMode="auto">
           <a:xfrm>
-            <a:off x="1921669" y="798369"/>
-            <a:ext cx="5329237" cy="3909359"/>
+            <a:off x="4471986" y="1612884"/>
+            <a:ext cx="3940095" cy="2189004"/>
           </a:xfrm>
           <a:prstGeom prst="rect">
             <a:avLst/>
           </a:prstGeom>
           <a:noFill/>
           <a:ln>
-            <a:noFill/>
+            <a:solidFill>
+              <a:schemeClr val="tx1"/>
+            </a:solidFill>
           </a:ln>
+        </p:spPr>
+      </p:pic>
+      <p:pic>
+        <p:nvPicPr>
+          <p:cNvPr id="8" name="Picture 7">
+            <a:extLst>
+              <a:ext uri="{FF2B5EF4-FFF2-40B4-BE49-F238E27FC236}">
+                <a16:creationId xmlns:a16="http://schemas.microsoft.com/office/drawing/2014/main" id="{2BF61612-5A0A-4081-BFE4-6338E91E613C}"/>
+              </a:ext>
+            </a:extLst>
+          </p:cNvPr>
+          <p:cNvPicPr/>
+          <p:nvPr/>
+        </p:nvPicPr>
+        <p:blipFill>
+          <a:blip r:embed="rId5">
+            <a:extLst>
+              <a:ext uri="{28A0092B-C50C-407E-A947-70E740481C1C}">
+                <a14:useLocalDpi xmlns:a14="http://schemas.microsoft.com/office/drawing/2010/main" val="0"/>
+              </a:ext>
+            </a:extLst>
+          </a:blip>
+          <a:srcRect/>
+          <a:stretch>
+            <a:fillRect/>
+          </a:stretch>
+        </p:blipFill>
+        <p:spPr bwMode="auto">
+          <a:xfrm>
+            <a:off x="4215723" y="3417233"/>
+            <a:ext cx="4452620" cy="929640"/>
+          </a:xfrm>
+          <a:prstGeom prst="rect">
+            <a:avLst/>
+          </a:prstGeom>
+          <a:noFill/>
+          <a:ln>
+            <a:solidFill>
+              <a:schemeClr val="tx1"/>
+            </a:solidFill>
+          </a:ln>
+        </p:spPr>
+      </p:pic>
+      <p:pic>
+        <p:nvPicPr>
+          <p:cNvPr id="12" name="Picture 11">
+            <a:extLst>
+              <a:ext uri="{FF2B5EF4-FFF2-40B4-BE49-F238E27FC236}">
+                <a16:creationId xmlns:a16="http://schemas.microsoft.com/office/drawing/2014/main" id="{EB463F74-8934-449E-8657-E593985C1DB4}"/>
+              </a:ext>
+            </a:extLst>
+          </p:cNvPr>
+          <p:cNvPicPr/>
+          <p:nvPr/>
+        </p:nvPicPr>
+        <p:blipFill rotWithShape="1">
+          <a:blip r:embed="rId6">
+            <a:extLst>
+              <a:ext uri="{28A0092B-C50C-407E-A947-70E740481C1C}">
+                <a14:useLocalDpi xmlns:a14="http://schemas.microsoft.com/office/drawing/2010/main" val="0"/>
+              </a:ext>
+            </a:extLst>
+          </a:blip>
+          <a:srcRect t="10423" b="3585"/>
+          <a:stretch/>
+        </p:blipFill>
+        <p:spPr bwMode="auto">
+          <a:xfrm>
+            <a:off x="4294430" y="2159876"/>
+            <a:ext cx="4578985" cy="1008993"/>
+          </a:xfrm>
+          <a:prstGeom prst="rect">
+            <a:avLst/>
+          </a:prstGeom>
+          <a:noFill/>
+          <a:ln>
+            <a:solidFill>
+              <a:schemeClr val="tx1"/>
+            </a:solidFill>
+          </a:ln>
+          <a:extLst>
+            <a:ext uri="{53640926-AAD7-44D8-BBD7-CCE9431645EC}">
+              <a14:shadowObscured xmlns:a14="http://schemas.microsoft.com/office/drawing/2010/main"/>
+            </a:ext>
+          </a:extLst>
         </p:spPr>
       </p:pic>
     </p:spTree>
@@ -12664,6 +12816,309 @@
   <p:clrMapOvr>
     <a:masterClrMapping/>
   </p:clrMapOvr>
+  <p:timing>
+    <p:tnLst>
+      <p:par>
+        <p:cTn id="1" dur="indefinite" restart="never" nodeType="tmRoot">
+          <p:childTnLst>
+            <p:seq concurrent="1" nextAc="seek">
+              <p:cTn id="2" dur="indefinite" nodeType="mainSeq">
+                <p:childTnLst>
+                  <p:par>
+                    <p:cTn id="3" fill="hold">
+                      <p:stCondLst>
+                        <p:cond delay="indefinite"/>
+                      </p:stCondLst>
+                      <p:childTnLst>
+                        <p:par>
+                          <p:cTn id="4" fill="hold">
+                            <p:stCondLst>
+                              <p:cond delay="0"/>
+                            </p:stCondLst>
+                            <p:childTnLst>
+                              <p:par>
+                                <p:cTn id="5" presetID="42" presetClass="path" presetSubtype="0" accel="50000" decel="50000" fill="hold" nodeType="clickEffect">
+                                  <p:stCondLst>
+                                    <p:cond delay="0"/>
+                                  </p:stCondLst>
+                                  <p:childTnLst>
+                                    <p:animMotion origin="layout" path="M 0 -4.5679E-6 L -0.23993 -4.5679E-6 " pathEditMode="relative" rAng="0" ptsTypes="AA">
+                                      <p:cBhvr>
+                                        <p:cTn id="6" dur="800" fill="hold"/>
+                                        <p:tgtEl>
+                                          <p:spTgt spid="6"/>
+                                        </p:tgtEl>
+                                        <p:attrNameLst>
+                                          <p:attrName>ppt_x</p:attrName>
+                                          <p:attrName>ppt_y</p:attrName>
+                                        </p:attrNameLst>
+                                      </p:cBhvr>
+                                      <p:rCtr x="-11997" y="0"/>
+                                    </p:animMotion>
+                                  </p:childTnLst>
+                                </p:cTn>
+                              </p:par>
+                              <p:par>
+                                <p:cTn id="7" presetID="10" presetClass="entr" presetSubtype="0" fill="hold" nodeType="withEffect">
+                                  <p:stCondLst>
+                                    <p:cond delay="0"/>
+                                  </p:stCondLst>
+                                  <p:childTnLst>
+                                    <p:set>
+                                      <p:cBhvr>
+                                        <p:cTn id="8" dur="1" fill="hold">
+                                          <p:stCondLst>
+                                            <p:cond delay="0"/>
+                                          </p:stCondLst>
+                                        </p:cTn>
+                                        <p:tgtEl>
+                                          <p:spTgt spid="7"/>
+                                        </p:tgtEl>
+                                        <p:attrNameLst>
+                                          <p:attrName>style.visibility</p:attrName>
+                                        </p:attrNameLst>
+                                      </p:cBhvr>
+                                      <p:to>
+                                        <p:strVal val="visible"/>
+                                      </p:to>
+                                    </p:set>
+                                    <p:animEffect transition="in" filter="fade">
+                                      <p:cBhvr>
+                                        <p:cTn id="9" dur="500"/>
+                                        <p:tgtEl>
+                                          <p:spTgt spid="7"/>
+                                        </p:tgtEl>
+                                      </p:cBhvr>
+                                    </p:animEffect>
+                                  </p:childTnLst>
+                                </p:cTn>
+                              </p:par>
+                            </p:childTnLst>
+                          </p:cTn>
+                        </p:par>
+                      </p:childTnLst>
+                    </p:cTn>
+                  </p:par>
+                  <p:par>
+                    <p:cTn id="10" fill="hold">
+                      <p:stCondLst>
+                        <p:cond delay="indefinite"/>
+                      </p:stCondLst>
+                      <p:childTnLst>
+                        <p:par>
+                          <p:cTn id="11" fill="hold">
+                            <p:stCondLst>
+                              <p:cond delay="0"/>
+                            </p:stCondLst>
+                            <p:childTnLst>
+                              <p:par>
+                                <p:cTn id="12" presetID="42" presetClass="path" presetSubtype="0" accel="50000" decel="50000" fill="hold" nodeType="clickEffect">
+                                  <p:stCondLst>
+                                    <p:cond delay="0"/>
+                                  </p:stCondLst>
+                                  <p:childTnLst>
+                                    <p:animMotion origin="layout" path="M 0.00035 -4.5679E-6 L 0.00018 -0.14012 " pathEditMode="relative" rAng="0" ptsTypes="AA">
+                                      <p:cBhvr>
+                                        <p:cTn id="13" dur="800" fill="hold"/>
+                                        <p:tgtEl>
+                                          <p:spTgt spid="7"/>
+                                        </p:tgtEl>
+                                        <p:attrNameLst>
+                                          <p:attrName>ppt_x</p:attrName>
+                                          <p:attrName>ppt_y</p:attrName>
+                                        </p:attrNameLst>
+                                      </p:cBhvr>
+                                      <p:rCtr x="-17" y="-7006"/>
+                                    </p:animMotion>
+                                  </p:childTnLst>
+                                </p:cTn>
+                              </p:par>
+                              <p:par>
+                                <p:cTn id="14" presetID="10" presetClass="entr" presetSubtype="0" fill="hold" nodeType="withEffect">
+                                  <p:stCondLst>
+                                    <p:cond delay="0"/>
+                                  </p:stCondLst>
+                                  <p:childTnLst>
+                                    <p:set>
+                                      <p:cBhvr>
+                                        <p:cTn id="15" dur="1" fill="hold">
+                                          <p:stCondLst>
+                                            <p:cond delay="0"/>
+                                          </p:stCondLst>
+                                        </p:cTn>
+                                        <p:tgtEl>
+                                          <p:spTgt spid="8"/>
+                                        </p:tgtEl>
+                                        <p:attrNameLst>
+                                          <p:attrName>style.visibility</p:attrName>
+                                        </p:attrNameLst>
+                                      </p:cBhvr>
+                                      <p:to>
+                                        <p:strVal val="visible"/>
+                                      </p:to>
+                                    </p:set>
+                                    <p:animEffect transition="in" filter="fade">
+                                      <p:cBhvr>
+                                        <p:cTn id="16" dur="500"/>
+                                        <p:tgtEl>
+                                          <p:spTgt spid="8"/>
+                                        </p:tgtEl>
+                                      </p:cBhvr>
+                                    </p:animEffect>
+                                  </p:childTnLst>
+                                </p:cTn>
+                              </p:par>
+                            </p:childTnLst>
+                          </p:cTn>
+                        </p:par>
+                      </p:childTnLst>
+                    </p:cTn>
+                  </p:par>
+                  <p:par>
+                    <p:cTn id="17" fill="hold">
+                      <p:stCondLst>
+                        <p:cond delay="indefinite"/>
+                      </p:stCondLst>
+                      <p:childTnLst>
+                        <p:par>
+                          <p:cTn id="18" fill="hold">
+                            <p:stCondLst>
+                              <p:cond delay="0"/>
+                            </p:stCondLst>
+                            <p:childTnLst>
+                              <p:par>
+                                <p:cTn id="19" presetID="10" presetClass="entr" presetSubtype="0" fill="hold" nodeType="clickEffect">
+                                  <p:stCondLst>
+                                    <p:cond delay="0"/>
+                                  </p:stCondLst>
+                                  <p:childTnLst>
+                                    <p:set>
+                                      <p:cBhvr>
+                                        <p:cTn id="20" dur="1" fill="hold">
+                                          <p:stCondLst>
+                                            <p:cond delay="0"/>
+                                          </p:stCondLst>
+                                        </p:cTn>
+                                        <p:tgtEl>
+                                          <p:spTgt spid="12"/>
+                                        </p:tgtEl>
+                                        <p:attrNameLst>
+                                          <p:attrName>style.visibility</p:attrName>
+                                        </p:attrNameLst>
+                                      </p:cBhvr>
+                                      <p:to>
+                                        <p:strVal val="visible"/>
+                                      </p:to>
+                                    </p:set>
+                                    <p:animEffect transition="in" filter="fade">
+                                      <p:cBhvr>
+                                        <p:cTn id="21" dur="500"/>
+                                        <p:tgtEl>
+                                          <p:spTgt spid="12"/>
+                                        </p:tgtEl>
+                                      </p:cBhvr>
+                                    </p:animEffect>
+                                  </p:childTnLst>
+                                </p:cTn>
+                              </p:par>
+                              <p:par>
+                                <p:cTn id="22" presetID="10" presetClass="exit" presetSubtype="0" fill="hold" nodeType="withEffect">
+                                  <p:stCondLst>
+                                    <p:cond delay="0"/>
+                                  </p:stCondLst>
+                                  <p:childTnLst>
+                                    <p:animEffect transition="out" filter="fade">
+                                      <p:cBhvr>
+                                        <p:cTn id="23" dur="500"/>
+                                        <p:tgtEl>
+                                          <p:spTgt spid="7"/>
+                                        </p:tgtEl>
+                                      </p:cBhvr>
+                                    </p:animEffect>
+                                    <p:set>
+                                      <p:cBhvr>
+                                        <p:cTn id="24" dur="1" fill="hold">
+                                          <p:stCondLst>
+                                            <p:cond delay="499"/>
+                                          </p:stCondLst>
+                                        </p:cTn>
+                                        <p:tgtEl>
+                                          <p:spTgt spid="7"/>
+                                        </p:tgtEl>
+                                        <p:attrNameLst>
+                                          <p:attrName>style.visibility</p:attrName>
+                                        </p:attrNameLst>
+                                      </p:cBhvr>
+                                      <p:to>
+                                        <p:strVal val="hidden"/>
+                                      </p:to>
+                                    </p:set>
+                                  </p:childTnLst>
+                                </p:cTn>
+                              </p:par>
+                              <p:par>
+                                <p:cTn id="25" presetID="10" presetClass="exit" presetSubtype="0" fill="hold" nodeType="withEffect">
+                                  <p:stCondLst>
+                                    <p:cond delay="0"/>
+                                  </p:stCondLst>
+                                  <p:childTnLst>
+                                    <p:animEffect transition="out" filter="fade">
+                                      <p:cBhvr>
+                                        <p:cTn id="26" dur="500"/>
+                                        <p:tgtEl>
+                                          <p:spTgt spid="8"/>
+                                        </p:tgtEl>
+                                      </p:cBhvr>
+                                    </p:animEffect>
+                                    <p:set>
+                                      <p:cBhvr>
+                                        <p:cTn id="27" dur="1" fill="hold">
+                                          <p:stCondLst>
+                                            <p:cond delay="499"/>
+                                          </p:stCondLst>
+                                        </p:cTn>
+                                        <p:tgtEl>
+                                          <p:spTgt spid="8"/>
+                                        </p:tgtEl>
+                                        <p:attrNameLst>
+                                          <p:attrName>style.visibility</p:attrName>
+                                        </p:attrNameLst>
+                                      </p:cBhvr>
+                                      <p:to>
+                                        <p:strVal val="hidden"/>
+                                      </p:to>
+                                    </p:set>
+                                  </p:childTnLst>
+                                </p:cTn>
+                              </p:par>
+                            </p:childTnLst>
+                          </p:cTn>
+                        </p:par>
+                      </p:childTnLst>
+                    </p:cTn>
+                  </p:par>
+                </p:childTnLst>
+              </p:cTn>
+              <p:prevCondLst>
+                <p:cond evt="onPrev" delay="0">
+                  <p:tgtEl>
+                    <p:sldTgt/>
+                  </p:tgtEl>
+                </p:cond>
+              </p:prevCondLst>
+              <p:nextCondLst>
+                <p:cond evt="onNext" delay="0">
+                  <p:tgtEl>
+                    <p:sldTgt/>
+                  </p:tgtEl>
+                </p:cond>
+              </p:nextCondLst>
+            </p:seq>
+          </p:childTnLst>
+        </p:cTn>
+      </p:par>
+    </p:tnLst>
+  </p:timing>
 </p:sld>
 </file>
 
@@ -12973,7 +13428,7 @@
           <a:p>
             <a:r>
               <a:rPr lang="en-US"/>
-              <a:t>Output class diagram</a:t>
+              <a:t>class diagram for output</a:t>
             </a:r>
           </a:p>
         </p:txBody>
@@ -13014,10 +13469,10 @@
       </p:cxnSp>
       <p:pic>
         <p:nvPicPr>
-          <p:cNvPr id="6" name="Picture 5">
+          <p:cNvPr id="5" name="Picture 4">
             <a:extLst>
               <a:ext uri="{FF2B5EF4-FFF2-40B4-BE49-F238E27FC236}">
-                <a16:creationId xmlns:a16="http://schemas.microsoft.com/office/drawing/2014/main" id="{0540DB28-6D2B-4FA9-8EF3-60C19633F772}"/>
+                <a16:creationId xmlns:a16="http://schemas.microsoft.com/office/drawing/2014/main" id="{104B41FE-D849-44DB-865F-B5502998CA54}"/>
               </a:ext>
             </a:extLst>
           </p:cNvPr>
@@ -13032,49 +13487,212 @@
               </a:ext>
             </a:extLst>
           </a:blip>
-          <a:srcRect l="1079" t="1562" r="3406" b="12591"/>
+          <a:srcRect l="3354" t="6085" r="5774" b="4677"/>
           <a:stretch/>
         </p:blipFill>
         <p:spPr bwMode="auto">
           <a:xfrm>
-            <a:off x="1739820" y="743124"/>
-            <a:ext cx="5664359" cy="3742683"/>
+            <a:off x="1993106" y="951654"/>
+            <a:ext cx="5236369" cy="3515710"/>
           </a:xfrm>
           <a:prstGeom prst="rect">
             <a:avLst/>
           </a:prstGeom>
           <a:noFill/>
-          <a:ln w="127" cap="flat" cmpd="sng" algn="ctr">
-            <a:solidFill>
-              <a:sysClr val="windowText" lastClr="000000"/>
-            </a:solidFill>
-            <a:prstDash val="solid"/>
-            <a:round/>
-            <a:headEnd type="none" w="med" len="med"/>
-            <a:tailEnd type="none" w="med" len="med"/>
+          <a:ln>
+            <a:noFill/>
+          </a:ln>
+        </p:spPr>
+      </p:pic>
+      <p:pic>
+        <p:nvPicPr>
+          <p:cNvPr id="8" name="Picture 7">
             <a:extLst>
-              <a:ext uri="{C807C97D-BFC1-408E-A445-0C87EB9F89A2}">
-                <ask:lineSketchStyleProps xmlns:ask="http://schemas.microsoft.com/office/drawing/2018/sketchyshapes" sd="0">
-                  <a:custGeom>
-                    <a:avLst/>
-                    <a:gdLst/>
-                    <a:ahLst/>
-                    <a:cxnLst/>
-                    <a:rect l="0" t="0" r="0" b="0"/>
-                    <a:pathLst/>
-                  </a:custGeom>
-                  <ask:type/>
-                </ask:lineSketchStyleProps>
+              <a:ext uri="{FF2B5EF4-FFF2-40B4-BE49-F238E27FC236}">
+                <a16:creationId xmlns:a16="http://schemas.microsoft.com/office/drawing/2014/main" id="{A7A2B69D-19DD-4C70-8DDC-2124419F1FA8}"/>
               </a:ext>
             </a:extLst>
+          </p:cNvPr>
+          <p:cNvPicPr/>
+          <p:nvPr/>
+        </p:nvPicPr>
+        <p:blipFill rotWithShape="1">
+          <a:blip r:embed="rId4">
+            <a:extLst>
+              <a:ext uri="{28A0092B-C50C-407E-A947-70E740481C1C}">
+                <a14:useLocalDpi xmlns:a14="http://schemas.microsoft.com/office/drawing/2010/main" val="0"/>
+              </a:ext>
+            </a:extLst>
+          </a:blip>
+          <a:srcRect r="2826"/>
+          <a:stretch/>
+        </p:blipFill>
+        <p:spPr bwMode="auto">
+          <a:xfrm>
+            <a:off x="2120117" y="1527100"/>
+            <a:ext cx="4903766" cy="2294255"/>
+          </a:xfrm>
+          <a:prstGeom prst="rect">
+            <a:avLst/>
+          </a:prstGeom>
+          <a:noFill/>
+          <a:ln>
+            <a:solidFill>
+              <a:schemeClr val="tx1"/>
+            </a:solidFill>
           </a:ln>
-          <a:extLst>
-            <a:ext uri="{53640926-AAD7-44D8-BBD7-CCE9431645EC}">
-              <a14:shadowObscured xmlns:a14="http://schemas.microsoft.com/office/drawing/2010/main"/>
-            </a:ext>
-          </a:extLst>
         </p:spPr>
       </p:pic>
+      <p:pic>
+        <p:nvPicPr>
+          <p:cNvPr id="13" name="Picture 12">
+            <a:extLst>
+              <a:ext uri="{FF2B5EF4-FFF2-40B4-BE49-F238E27FC236}">
+                <a16:creationId xmlns:a16="http://schemas.microsoft.com/office/drawing/2014/main" id="{DFC2805F-330E-4E63-BF7A-B9C6274552FC}"/>
+              </a:ext>
+            </a:extLst>
+          </p:cNvPr>
+          <p:cNvPicPr/>
+          <p:nvPr/>
+        </p:nvPicPr>
+        <p:blipFill>
+          <a:blip r:embed="rId5">
+            <a:extLst>
+              <a:ext uri="{28A0092B-C50C-407E-A947-70E740481C1C}">
+                <a14:useLocalDpi xmlns:a14="http://schemas.microsoft.com/office/drawing/2010/main" val="0"/>
+              </a:ext>
+            </a:extLst>
+          </a:blip>
+          <a:srcRect/>
+          <a:stretch>
+            <a:fillRect/>
+          </a:stretch>
+        </p:blipFill>
+        <p:spPr bwMode="auto">
+          <a:xfrm>
+            <a:off x="1965722" y="1400457"/>
+            <a:ext cx="5206365" cy="2618105"/>
+          </a:xfrm>
+          <a:prstGeom prst="rect">
+            <a:avLst/>
+          </a:prstGeom>
+          <a:noFill/>
+          <a:ln>
+            <a:solidFill>
+              <a:schemeClr val="tx1"/>
+            </a:solidFill>
+          </a:ln>
+        </p:spPr>
+      </p:pic>
+      <p:grpSp>
+        <p:nvGrpSpPr>
+          <p:cNvPr id="2" name="Group 1">
+            <a:extLst>
+              <a:ext uri="{FF2B5EF4-FFF2-40B4-BE49-F238E27FC236}">
+                <a16:creationId xmlns:a16="http://schemas.microsoft.com/office/drawing/2014/main" id="{6381C1A9-D4B8-492A-A6D8-C25600F015A8}"/>
+              </a:ext>
+            </a:extLst>
+          </p:cNvPr>
+          <p:cNvGrpSpPr/>
+          <p:nvPr/>
+        </p:nvGrpSpPr>
+        <p:grpSpPr>
+          <a:xfrm>
+            <a:off x="1965722" y="1693246"/>
+            <a:ext cx="5210175" cy="2128109"/>
+            <a:chOff x="268383" y="1024975"/>
+            <a:chExt cx="5210175" cy="2128109"/>
+          </a:xfrm>
+        </p:grpSpPr>
+        <p:pic>
+          <p:nvPicPr>
+            <p:cNvPr id="14" name="Picture 13" descr="Description: Graphical user interface, text, application&#10;&#10;Description automatically generated">
+              <a:extLst>
+                <a:ext uri="{FF2B5EF4-FFF2-40B4-BE49-F238E27FC236}">
+                  <a16:creationId xmlns:a16="http://schemas.microsoft.com/office/drawing/2014/main" id="{02C913C2-7324-437A-9621-877116487B83}"/>
+                </a:ext>
+              </a:extLst>
+            </p:cNvPr>
+            <p:cNvPicPr/>
+            <p:nvPr/>
+          </p:nvPicPr>
+          <p:blipFill rotWithShape="1">
+            <a:blip r:embed="rId6">
+              <a:extLst>
+                <a:ext uri="{28A0092B-C50C-407E-A947-70E740481C1C}">
+                  <a14:useLocalDpi xmlns:a14="http://schemas.microsoft.com/office/drawing/2010/main" val="0"/>
+                </a:ext>
+              </a:extLst>
+            </a:blip>
+            <a:srcRect t="1" b="38031"/>
+            <a:stretch/>
+          </p:blipFill>
+          <p:spPr bwMode="auto">
+            <a:xfrm>
+              <a:off x="268383" y="1024975"/>
+              <a:ext cx="5210175" cy="1868724"/>
+            </a:xfrm>
+            <a:prstGeom prst="rect">
+              <a:avLst/>
+            </a:prstGeom>
+            <a:noFill/>
+            <a:ln>
+              <a:solidFill>
+                <a:schemeClr val="tx1"/>
+              </a:solidFill>
+            </a:ln>
+            <a:extLst>
+              <a:ext uri="{53640926-AAD7-44D8-BBD7-CCE9431645EC}">
+                <a14:shadowObscured xmlns:a14="http://schemas.microsoft.com/office/drawing/2010/main"/>
+              </a:ext>
+            </a:extLst>
+          </p:spPr>
+        </p:pic>
+        <p:pic>
+          <p:nvPicPr>
+            <p:cNvPr id="15" name="Picture 14" descr="Description: Graphical user interface, text, application&#10;&#10;Description automatically generated">
+              <a:extLst>
+                <a:ext uri="{FF2B5EF4-FFF2-40B4-BE49-F238E27FC236}">
+                  <a16:creationId xmlns:a16="http://schemas.microsoft.com/office/drawing/2014/main" id="{1FE1CF9A-0820-4EFC-A44B-ACD6671AF6B1}"/>
+                </a:ext>
+              </a:extLst>
+            </p:cNvPr>
+            <p:cNvPicPr/>
+            <p:nvPr/>
+          </p:nvPicPr>
+          <p:blipFill rotWithShape="1">
+            <a:blip r:embed="rId6">
+              <a:extLst>
+                <a:ext uri="{28A0092B-C50C-407E-A947-70E740481C1C}">
+                  <a14:useLocalDpi xmlns:a14="http://schemas.microsoft.com/office/drawing/2010/main" val="0"/>
+                </a:ext>
+              </a:extLst>
+            </a:blip>
+            <a:srcRect t="93906" b="-1"/>
+            <a:stretch/>
+          </p:blipFill>
+          <p:spPr bwMode="auto">
+            <a:xfrm>
+              <a:off x="268383" y="2969289"/>
+              <a:ext cx="5210175" cy="183795"/>
+            </a:xfrm>
+            <a:prstGeom prst="rect">
+              <a:avLst/>
+            </a:prstGeom>
+            <a:noFill/>
+            <a:ln>
+              <a:solidFill>
+                <a:schemeClr val="tx1"/>
+              </a:solidFill>
+            </a:ln>
+            <a:extLst>
+              <a:ext uri="{53640926-AAD7-44D8-BBD7-CCE9431645EC}">
+                <a14:shadowObscured xmlns:a14="http://schemas.microsoft.com/office/drawing/2010/main"/>
+              </a:ext>
+            </a:extLst>
+          </p:spPr>
+        </p:pic>
+      </p:grpSp>
     </p:spTree>
     <p:extLst>
       <p:ext uri="{BB962C8B-B14F-4D97-AF65-F5344CB8AC3E}">
@@ -13085,6 +13703,300 @@
   <p:clrMapOvr>
     <a:masterClrMapping/>
   </p:clrMapOvr>
+  <p:timing>
+    <p:tnLst>
+      <p:par>
+        <p:cTn id="1" dur="indefinite" restart="never" nodeType="tmRoot">
+          <p:childTnLst>
+            <p:seq concurrent="1" nextAc="seek">
+              <p:cTn id="2" dur="indefinite" nodeType="mainSeq">
+                <p:childTnLst>
+                  <p:par>
+                    <p:cTn id="3" fill="hold">
+                      <p:stCondLst>
+                        <p:cond delay="indefinite"/>
+                      </p:stCondLst>
+                      <p:childTnLst>
+                        <p:par>
+                          <p:cTn id="4" fill="hold">
+                            <p:stCondLst>
+                              <p:cond delay="0"/>
+                            </p:stCondLst>
+                            <p:childTnLst>
+                              <p:par>
+                                <p:cTn id="5" presetID="10" presetClass="exit" presetSubtype="0" fill="hold" nodeType="clickEffect">
+                                  <p:stCondLst>
+                                    <p:cond delay="0"/>
+                                  </p:stCondLst>
+                                  <p:childTnLst>
+                                    <p:animEffect transition="out" filter="fade">
+                                      <p:cBhvr>
+                                        <p:cTn id="6" dur="500"/>
+                                        <p:tgtEl>
+                                          <p:spTgt spid="5"/>
+                                        </p:tgtEl>
+                                      </p:cBhvr>
+                                    </p:animEffect>
+                                    <p:set>
+                                      <p:cBhvr>
+                                        <p:cTn id="7" dur="1" fill="hold">
+                                          <p:stCondLst>
+                                            <p:cond delay="499"/>
+                                          </p:stCondLst>
+                                        </p:cTn>
+                                        <p:tgtEl>
+                                          <p:spTgt spid="5"/>
+                                        </p:tgtEl>
+                                        <p:attrNameLst>
+                                          <p:attrName>style.visibility</p:attrName>
+                                        </p:attrNameLst>
+                                      </p:cBhvr>
+                                      <p:to>
+                                        <p:strVal val="hidden"/>
+                                      </p:to>
+                                    </p:set>
+                                  </p:childTnLst>
+                                </p:cTn>
+                              </p:par>
+                              <p:par>
+                                <p:cTn id="8" presetID="10" presetClass="entr" presetSubtype="0" fill="hold" nodeType="withEffect">
+                                  <p:stCondLst>
+                                    <p:cond delay="0"/>
+                                  </p:stCondLst>
+                                  <p:childTnLst>
+                                    <p:set>
+                                      <p:cBhvr>
+                                        <p:cTn id="9" dur="1" fill="hold">
+                                          <p:stCondLst>
+                                            <p:cond delay="0"/>
+                                          </p:stCondLst>
+                                        </p:cTn>
+                                        <p:tgtEl>
+                                          <p:spTgt spid="8"/>
+                                        </p:tgtEl>
+                                        <p:attrNameLst>
+                                          <p:attrName>style.visibility</p:attrName>
+                                        </p:attrNameLst>
+                                      </p:cBhvr>
+                                      <p:to>
+                                        <p:strVal val="visible"/>
+                                      </p:to>
+                                    </p:set>
+                                    <p:animEffect transition="in" filter="fade">
+                                      <p:cBhvr>
+                                        <p:cTn id="10" dur="500"/>
+                                        <p:tgtEl>
+                                          <p:spTgt spid="8"/>
+                                        </p:tgtEl>
+                                      </p:cBhvr>
+                                    </p:animEffect>
+                                  </p:childTnLst>
+                                </p:cTn>
+                              </p:par>
+                            </p:childTnLst>
+                          </p:cTn>
+                        </p:par>
+                      </p:childTnLst>
+                    </p:cTn>
+                  </p:par>
+                  <p:par>
+                    <p:cTn id="11" fill="hold">
+                      <p:stCondLst>
+                        <p:cond delay="indefinite"/>
+                      </p:stCondLst>
+                      <p:childTnLst>
+                        <p:par>
+                          <p:cTn id="12" fill="hold">
+                            <p:stCondLst>
+                              <p:cond delay="0"/>
+                            </p:stCondLst>
+                            <p:childTnLst>
+                              <p:par>
+                                <p:cTn id="13" presetID="10" presetClass="exit" presetSubtype="0" fill="hold" nodeType="clickEffect">
+                                  <p:stCondLst>
+                                    <p:cond delay="0"/>
+                                  </p:stCondLst>
+                                  <p:childTnLst>
+                                    <p:animEffect transition="out" filter="fade">
+                                      <p:cBhvr>
+                                        <p:cTn id="14" dur="500"/>
+                                        <p:tgtEl>
+                                          <p:spTgt spid="8"/>
+                                        </p:tgtEl>
+                                      </p:cBhvr>
+                                    </p:animEffect>
+                                    <p:set>
+                                      <p:cBhvr>
+                                        <p:cTn id="15" dur="1" fill="hold">
+                                          <p:stCondLst>
+                                            <p:cond delay="499"/>
+                                          </p:stCondLst>
+                                        </p:cTn>
+                                        <p:tgtEl>
+                                          <p:spTgt spid="8"/>
+                                        </p:tgtEl>
+                                        <p:attrNameLst>
+                                          <p:attrName>style.visibility</p:attrName>
+                                        </p:attrNameLst>
+                                      </p:cBhvr>
+                                      <p:to>
+                                        <p:strVal val="hidden"/>
+                                      </p:to>
+                                    </p:set>
+                                  </p:childTnLst>
+                                </p:cTn>
+                              </p:par>
+                              <p:par>
+                                <p:cTn id="16" presetID="10" presetClass="entr" presetSubtype="0" fill="hold" nodeType="withEffect">
+                                  <p:stCondLst>
+                                    <p:cond delay="0"/>
+                                  </p:stCondLst>
+                                  <p:childTnLst>
+                                    <p:set>
+                                      <p:cBhvr>
+                                        <p:cTn id="17" dur="1" fill="hold">
+                                          <p:stCondLst>
+                                            <p:cond delay="0"/>
+                                          </p:stCondLst>
+                                        </p:cTn>
+                                        <p:tgtEl>
+                                          <p:spTgt spid="13"/>
+                                        </p:tgtEl>
+                                        <p:attrNameLst>
+                                          <p:attrName>style.visibility</p:attrName>
+                                        </p:attrNameLst>
+                                      </p:cBhvr>
+                                      <p:to>
+                                        <p:strVal val="visible"/>
+                                      </p:to>
+                                    </p:set>
+                                    <p:animEffect transition="in" filter="fade">
+                                      <p:cBhvr>
+                                        <p:cTn id="18" dur="500"/>
+                                        <p:tgtEl>
+                                          <p:spTgt spid="13"/>
+                                        </p:tgtEl>
+                                      </p:cBhvr>
+                                    </p:animEffect>
+                                  </p:childTnLst>
+                                </p:cTn>
+                              </p:par>
+                            </p:childTnLst>
+                          </p:cTn>
+                        </p:par>
+                      </p:childTnLst>
+                    </p:cTn>
+                  </p:par>
+                  <p:par>
+                    <p:cTn id="19" fill="hold">
+                      <p:stCondLst>
+                        <p:cond delay="indefinite"/>
+                      </p:stCondLst>
+                      <p:childTnLst>
+                        <p:par>
+                          <p:cTn id="20" fill="hold">
+                            <p:stCondLst>
+                              <p:cond delay="0"/>
+                            </p:stCondLst>
+                            <p:childTnLst>
+                              <p:par>
+                                <p:cTn id="21" presetID="10" presetClass="exit" presetSubtype="0" fill="hold" nodeType="clickEffect">
+                                  <p:stCondLst>
+                                    <p:cond delay="0"/>
+                                  </p:stCondLst>
+                                  <p:childTnLst>
+                                    <p:animEffect transition="out" filter="fade">
+                                      <p:cBhvr>
+                                        <p:cTn id="22" dur="500"/>
+                                        <p:tgtEl>
+                                          <p:spTgt spid="13"/>
+                                        </p:tgtEl>
+                                      </p:cBhvr>
+                                    </p:animEffect>
+                                    <p:set>
+                                      <p:cBhvr>
+                                        <p:cTn id="23" dur="1" fill="hold">
+                                          <p:stCondLst>
+                                            <p:cond delay="499"/>
+                                          </p:stCondLst>
+                                        </p:cTn>
+                                        <p:tgtEl>
+                                          <p:spTgt spid="13"/>
+                                        </p:tgtEl>
+                                        <p:attrNameLst>
+                                          <p:attrName>style.visibility</p:attrName>
+                                        </p:attrNameLst>
+                                      </p:cBhvr>
+                                      <p:to>
+                                        <p:strVal val="hidden"/>
+                                      </p:to>
+                                    </p:set>
+                                  </p:childTnLst>
+                                </p:cTn>
+                              </p:par>
+                              <p:par>
+                                <p:cTn id="24" presetID="10" presetClass="entr" presetSubtype="0" fill="hold" nodeType="withEffect">
+                                  <p:stCondLst>
+                                    <p:cond delay="0"/>
+                                  </p:stCondLst>
+                                  <p:childTnLst>
+                                    <p:set>
+                                      <p:cBhvr>
+                                        <p:cTn id="25" dur="1" fill="hold">
+                                          <p:stCondLst>
+                                            <p:cond delay="0"/>
+                                          </p:stCondLst>
+                                        </p:cTn>
+                                        <p:tgtEl>
+                                          <p:spTgt spid="2"/>
+                                        </p:tgtEl>
+                                        <p:attrNameLst>
+                                          <p:attrName>style.visibility</p:attrName>
+                                        </p:attrNameLst>
+                                      </p:cBhvr>
+                                      <p:to>
+                                        <p:strVal val="visible"/>
+                                      </p:to>
+                                    </p:set>
+                                    <p:animEffect transition="in" filter="fade">
+                                      <p:cBhvr>
+                                        <p:cTn id="26" dur="500"/>
+                                        <p:tgtEl>
+                                          <p:spTgt spid="2"/>
+                                        </p:tgtEl>
+                                      </p:cBhvr>
+                                    </p:animEffect>
+                                  </p:childTnLst>
+                                </p:cTn>
+                              </p:par>
+                            </p:childTnLst>
+                          </p:cTn>
+                        </p:par>
+                      </p:childTnLst>
+                    </p:cTn>
+                  </p:par>
+                </p:childTnLst>
+              </p:cTn>
+              <p:prevCondLst>
+                <p:cond evt="onPrev" delay="0">
+                  <p:tgtEl>
+                    <p:sldTgt/>
+                  </p:tgtEl>
+                </p:cond>
+              </p:prevCondLst>
+              <p:nextCondLst>
+                <p:cond evt="onNext" delay="0">
+                  <p:tgtEl>
+                    <p:sldTgt/>
+                  </p:tgtEl>
+                </p:cond>
+              </p:nextCondLst>
+            </p:seq>
+          </p:childTnLst>
+        </p:cTn>
+      </p:par>
+    </p:tnLst>
+  </p:timing>
 </p:sld>
 </file>
 

</xml_diff>

<commit_message>
update the output package diagram and its following changes
</commit_message>
<xml_diff>
--- a/presentation/Final Project OOP Slides.pptx
+++ b/presentation/Final Project OOP Slides.pptx
@@ -27,15 +27,15 @@
   <p:notesSz cx="6858000" cy="9144000"/>
   <p:embeddedFontLst>
     <p:embeddedFont>
-      <p:font typeface="Didact Gothic" panose="020B0604020202020204" charset="0"/>
+      <p:font typeface="Didact Gothic" pitchFamily="2" charset="0"/>
       <p:regular r:id="rId17"/>
     </p:embeddedFont>
     <p:embeddedFont>
-      <p:font typeface="Julius Sans One" panose="020B0604020202020204" charset="0"/>
+      <p:font typeface="Julius Sans One" panose="02000000000000000000" pitchFamily="2" charset="77"/>
       <p:regular r:id="rId18"/>
     </p:embeddedFont>
     <p:embeddedFont>
-      <p:font typeface="Questrial" panose="020B0604020202020204" charset="-93"/>
+      <p:font typeface="Questrial" pitchFamily="2" charset="77"/>
       <p:regular r:id="rId19"/>
     </p:embeddedFont>
   </p:embeddedFontLst>
@@ -1563,7 +1563,7 @@
               </a:spcAft>
               <a:buNone/>
             </a:pPr>
-            <a:endParaRPr/>
+            <a:endParaRPr dirty="0"/>
           </a:p>
         </p:txBody>
       </p:sp>
@@ -1672,7 +1672,7 @@
               </a:spcAft>
               <a:buNone/>
             </a:pPr>
-            <a:endParaRPr/>
+            <a:endParaRPr dirty="0"/>
           </a:p>
         </p:txBody>
       </p:sp>
@@ -2221,7 +2221,7 @@
               </a:spcAft>
               <a:buNone/>
             </a:pPr>
-            <a:endParaRPr/>
+            <a:endParaRPr dirty="0"/>
           </a:p>
         </p:txBody>
       </p:sp>
@@ -11441,22 +11441,14 @@
           <p:nvPr/>
         </p:nvPicPr>
         <p:blipFill>
-          <a:blip r:embed="rId3" cstate="print">
-            <a:extLst>
-              <a:ext uri="{28A0092B-C50C-407E-A947-70E740481C1C}">
-                <a14:useLocalDpi xmlns:a14="http://schemas.microsoft.com/office/drawing/2010/main" val="0"/>
-              </a:ext>
-            </a:extLst>
-          </a:blip>
+          <a:blip r:embed="rId3"/>
           <a:srcRect/>
-          <a:stretch>
-            <a:fillRect/>
-          </a:stretch>
+          <a:stretch/>
         </p:blipFill>
         <p:spPr bwMode="auto">
           <a:xfrm>
-            <a:off x="1734821" y="864395"/>
-            <a:ext cx="5732667" cy="4093366"/>
+            <a:off x="1794407" y="809531"/>
+            <a:ext cx="5555186" cy="4093366"/>
           </a:xfrm>
           <a:prstGeom prst="rect">
             <a:avLst/>
@@ -13480,20 +13472,14 @@
           <p:nvPr/>
         </p:nvPicPr>
         <p:blipFill rotWithShape="1">
-          <a:blip r:embed="rId3" cstate="print">
-            <a:extLst>
-              <a:ext uri="{28A0092B-C50C-407E-A947-70E740481C1C}">
-                <a14:useLocalDpi xmlns:a14="http://schemas.microsoft.com/office/drawing/2010/main" val="0"/>
-              </a:ext>
-            </a:extLst>
-          </a:blip>
-          <a:srcRect l="3354" t="6085" r="5774" b="4677"/>
+          <a:blip r:embed="rId3"/>
+          <a:srcRect l="2508" t="6290" r="6494" b="4863"/>
           <a:stretch/>
         </p:blipFill>
         <p:spPr bwMode="auto">
           <a:xfrm>
-            <a:off x="1993106" y="951654"/>
-            <a:ext cx="5236369" cy="3515710"/>
+            <a:off x="2178621" y="1159606"/>
+            <a:ext cx="4780566" cy="3099806"/>
           </a:xfrm>
           <a:prstGeom prst="rect">
             <a:avLst/>

</xml_diff>